<commit_message>
Add .gitattributes file to normalize line endings
</commit_message>
<xml_diff>
--- a/assets/holleH.pptx
+++ b/assets/holleH.pptx
@@ -4,8 +4,13 @@
   <p:sldMasterIdLst>
     <p:sldMasterId id="2147483648" r:id="rId1"/>
   </p:sldMasterIdLst>
+  <p:notesMasterIdLst>
+    <p:notesMasterId r:id="rId5"/>
+  </p:notesMasterIdLst>
   <p:sldIdLst>
     <p:sldId id="256" r:id="rId2"/>
+    <p:sldId id="257" r:id="rId3"/>
+    <p:sldId id="258" r:id="rId4"/>
   </p:sldIdLst>
   <p:sldSz cx="12192000" cy="6858000"/>
   <p:notesSz cx="6858000" cy="9144000"/>
@@ -104,7 +109,445 @@
       </a:defRPr>
     </a:lvl9pPr>
   </p:defaultTextStyle>
+  <p:extLst>
+    <p:ext uri="{EFAFB233-063F-42B5-8137-9DF3F51BA10A}">
+      <p15:sldGuideLst xmlns:p15="http://schemas.microsoft.com/office/powerpoint/2012/main"/>
+    </p:ext>
+  </p:extLst>
 </p:presentation>
+</file>
+
+<file path=ppt/notesMasters/notesMaster1.xml><?xml version="1.0" encoding="utf-8"?>
+<p:notesMaster xmlns:a="http://schemas.openxmlformats.org/drawingml/2006/main" xmlns:r="http://schemas.openxmlformats.org/officeDocument/2006/relationships" xmlns:p="http://schemas.openxmlformats.org/presentationml/2006/main">
+  <p:cSld>
+    <p:bg>
+      <p:bgRef idx="1001">
+        <a:schemeClr val="bg1"/>
+      </p:bgRef>
+    </p:bg>
+    <p:spTree>
+      <p:nvGrpSpPr>
+        <p:cNvPr id="1" name=""/>
+        <p:cNvGrpSpPr/>
+        <p:nvPr/>
+      </p:nvGrpSpPr>
+      <p:grpSpPr>
+        <a:xfrm>
+          <a:off x="0" y="0"/>
+          <a:ext cx="0" cy="0"/>
+          <a:chOff x="0" y="0"/>
+          <a:chExt cx="0" cy="0"/>
+        </a:xfrm>
+      </p:grpSpPr>
+      <p:sp>
+        <p:nvSpPr>
+          <p:cNvPr id="2" name="Kopfzeilenplatzhalter 1"/>
+          <p:cNvSpPr>
+            <a:spLocks noGrp="1"/>
+          </p:cNvSpPr>
+          <p:nvPr>
+            <p:ph type="hdr" sz="quarter"/>
+          </p:nvPr>
+        </p:nvSpPr>
+        <p:spPr>
+          <a:xfrm>
+            <a:off x="0" y="0"/>
+            <a:ext cx="2971800" cy="458788"/>
+          </a:xfrm>
+          <a:prstGeom prst="rect">
+            <a:avLst/>
+          </a:prstGeom>
+        </p:spPr>
+        <p:txBody>
+          <a:bodyPr vert="horz" lIns="91440" tIns="45720" rIns="91440" bIns="45720" rtlCol="0"/>
+          <a:lstStyle>
+            <a:lvl1pPr algn="l">
+              <a:defRPr sz="1200"/>
+            </a:lvl1pPr>
+          </a:lstStyle>
+          <a:p>
+            <a:endParaRPr lang="de-DE"/>
+          </a:p>
+        </p:txBody>
+      </p:sp>
+      <p:sp>
+        <p:nvSpPr>
+          <p:cNvPr id="3" name="Datumsplatzhalter 2"/>
+          <p:cNvSpPr>
+            <a:spLocks noGrp="1"/>
+          </p:cNvSpPr>
+          <p:nvPr>
+            <p:ph type="dt" idx="1"/>
+          </p:nvPr>
+        </p:nvSpPr>
+        <p:spPr>
+          <a:xfrm>
+            <a:off x="3884613" y="0"/>
+            <a:ext cx="2971800" cy="458788"/>
+          </a:xfrm>
+          <a:prstGeom prst="rect">
+            <a:avLst/>
+          </a:prstGeom>
+        </p:spPr>
+        <p:txBody>
+          <a:bodyPr vert="horz" lIns="91440" tIns="45720" rIns="91440" bIns="45720" rtlCol="0"/>
+          <a:lstStyle>
+            <a:lvl1pPr algn="r">
+              <a:defRPr sz="1200"/>
+            </a:lvl1pPr>
+          </a:lstStyle>
+          <a:p>
+            <a:fld id="{F6ED8F43-B394-41D9-8284-707B14DD7662}" type="datetimeFigureOut">
+              <a:rPr lang="de-DE" smtClean="0"/>
+              <a:t>15.06.2024</a:t>
+            </a:fld>
+            <a:endParaRPr lang="de-DE"/>
+          </a:p>
+        </p:txBody>
+      </p:sp>
+      <p:sp>
+        <p:nvSpPr>
+          <p:cNvPr id="4" name="Folienbildplatzhalter 3"/>
+          <p:cNvSpPr>
+            <a:spLocks noGrp="1" noRot="1" noChangeAspect="1"/>
+          </p:cNvSpPr>
+          <p:nvPr>
+            <p:ph type="sldImg" idx="2"/>
+          </p:nvPr>
+        </p:nvSpPr>
+        <p:spPr>
+          <a:xfrm>
+            <a:off x="685800" y="1143000"/>
+            <a:ext cx="5486400" cy="3086100"/>
+          </a:xfrm>
+          <a:prstGeom prst="rect">
+            <a:avLst/>
+          </a:prstGeom>
+          <a:noFill/>
+          <a:ln w="12700">
+            <a:solidFill>
+              <a:prstClr val="black"/>
+            </a:solidFill>
+          </a:ln>
+        </p:spPr>
+        <p:txBody>
+          <a:bodyPr vert="horz" lIns="91440" tIns="45720" rIns="91440" bIns="45720" rtlCol="0" anchor="ctr"/>
+          <a:lstStyle/>
+          <a:p>
+            <a:endParaRPr lang="de-DE"/>
+          </a:p>
+        </p:txBody>
+      </p:sp>
+      <p:sp>
+        <p:nvSpPr>
+          <p:cNvPr id="5" name="Notizenplatzhalter 4"/>
+          <p:cNvSpPr>
+            <a:spLocks noGrp="1"/>
+          </p:cNvSpPr>
+          <p:nvPr>
+            <p:ph type="body" sz="quarter" idx="3"/>
+          </p:nvPr>
+        </p:nvSpPr>
+        <p:spPr>
+          <a:xfrm>
+            <a:off x="685800" y="4400550"/>
+            <a:ext cx="5486400" cy="3600450"/>
+          </a:xfrm>
+          <a:prstGeom prst="rect">
+            <a:avLst/>
+          </a:prstGeom>
+        </p:spPr>
+        <p:txBody>
+          <a:bodyPr vert="horz" lIns="91440" tIns="45720" rIns="91440" bIns="45720" rtlCol="0"/>
+          <a:lstStyle/>
+          <a:p>
+            <a:pPr lvl="0"/>
+            <a:r>
+              <a:rPr lang="de-DE"/>
+              <a:t>Mastertextformat bearbeiten</a:t>
+            </a:r>
+          </a:p>
+          <a:p>
+            <a:pPr lvl="1"/>
+            <a:r>
+              <a:rPr lang="de-DE"/>
+              <a:t>Zweite Ebene</a:t>
+            </a:r>
+          </a:p>
+          <a:p>
+            <a:pPr lvl="2"/>
+            <a:r>
+              <a:rPr lang="de-DE"/>
+              <a:t>Dritte Ebene</a:t>
+            </a:r>
+          </a:p>
+          <a:p>
+            <a:pPr lvl="3"/>
+            <a:r>
+              <a:rPr lang="de-DE"/>
+              <a:t>Vierte Ebene</a:t>
+            </a:r>
+          </a:p>
+          <a:p>
+            <a:pPr lvl="4"/>
+            <a:r>
+              <a:rPr lang="de-DE"/>
+              <a:t>Fünfte Ebene</a:t>
+            </a:r>
+          </a:p>
+        </p:txBody>
+      </p:sp>
+      <p:sp>
+        <p:nvSpPr>
+          <p:cNvPr id="6" name="Fußzeilenplatzhalter 5"/>
+          <p:cNvSpPr>
+            <a:spLocks noGrp="1"/>
+          </p:cNvSpPr>
+          <p:nvPr>
+            <p:ph type="ftr" sz="quarter" idx="4"/>
+          </p:nvPr>
+        </p:nvSpPr>
+        <p:spPr>
+          <a:xfrm>
+            <a:off x="0" y="8685213"/>
+            <a:ext cx="2971800" cy="458787"/>
+          </a:xfrm>
+          <a:prstGeom prst="rect">
+            <a:avLst/>
+          </a:prstGeom>
+        </p:spPr>
+        <p:txBody>
+          <a:bodyPr vert="horz" lIns="91440" tIns="45720" rIns="91440" bIns="45720" rtlCol="0" anchor="b"/>
+          <a:lstStyle>
+            <a:lvl1pPr algn="l">
+              <a:defRPr sz="1200"/>
+            </a:lvl1pPr>
+          </a:lstStyle>
+          <a:p>
+            <a:endParaRPr lang="de-DE"/>
+          </a:p>
+        </p:txBody>
+      </p:sp>
+      <p:sp>
+        <p:nvSpPr>
+          <p:cNvPr id="7" name="Foliennummernplatzhalter 6"/>
+          <p:cNvSpPr>
+            <a:spLocks noGrp="1"/>
+          </p:cNvSpPr>
+          <p:nvPr>
+            <p:ph type="sldNum" sz="quarter" idx="5"/>
+          </p:nvPr>
+        </p:nvSpPr>
+        <p:spPr>
+          <a:xfrm>
+            <a:off x="3884613" y="8685213"/>
+            <a:ext cx="2971800" cy="458787"/>
+          </a:xfrm>
+          <a:prstGeom prst="rect">
+            <a:avLst/>
+          </a:prstGeom>
+        </p:spPr>
+        <p:txBody>
+          <a:bodyPr vert="horz" lIns="91440" tIns="45720" rIns="91440" bIns="45720" rtlCol="0" anchor="b"/>
+          <a:lstStyle>
+            <a:lvl1pPr algn="r">
+              <a:defRPr sz="1200"/>
+            </a:lvl1pPr>
+          </a:lstStyle>
+          <a:p>
+            <a:fld id="{EF4C78AD-A505-42C8-A2CC-46444F9468BB}" type="slidenum">
+              <a:rPr lang="de-DE" smtClean="0"/>
+              <a:t>‹Nr.›</a:t>
+            </a:fld>
+            <a:endParaRPr lang="de-DE"/>
+          </a:p>
+        </p:txBody>
+      </p:sp>
+    </p:spTree>
+    <p:extLst>
+      <p:ext uri="{BB962C8B-B14F-4D97-AF65-F5344CB8AC3E}">
+        <p14:creationId xmlns:p14="http://schemas.microsoft.com/office/powerpoint/2010/main" val="4010135205"/>
+      </p:ext>
+    </p:extLst>
+  </p:cSld>
+  <p:clrMap bg1="lt1" tx1="dk1" bg2="lt2" tx2="dk2" accent1="accent1" accent2="accent2" accent3="accent3" accent4="accent4" accent5="accent5" accent6="accent6" hlink="hlink" folHlink="folHlink"/>
+  <p:notesStyle>
+    <a:lvl1pPr marL="0" algn="l" defTabSz="914400" rtl="0" eaLnBrk="1" latinLnBrk="0" hangingPunct="1">
+      <a:defRPr sz="1200" kern="1200">
+        <a:solidFill>
+          <a:schemeClr val="tx1"/>
+        </a:solidFill>
+        <a:latin typeface="+mn-lt"/>
+        <a:ea typeface="+mn-ea"/>
+        <a:cs typeface="+mn-cs"/>
+      </a:defRPr>
+    </a:lvl1pPr>
+    <a:lvl2pPr marL="457200" algn="l" defTabSz="914400" rtl="0" eaLnBrk="1" latinLnBrk="0" hangingPunct="1">
+      <a:defRPr sz="1200" kern="1200">
+        <a:solidFill>
+          <a:schemeClr val="tx1"/>
+        </a:solidFill>
+        <a:latin typeface="+mn-lt"/>
+        <a:ea typeface="+mn-ea"/>
+        <a:cs typeface="+mn-cs"/>
+      </a:defRPr>
+    </a:lvl2pPr>
+    <a:lvl3pPr marL="914400" algn="l" defTabSz="914400" rtl="0" eaLnBrk="1" latinLnBrk="0" hangingPunct="1">
+      <a:defRPr sz="1200" kern="1200">
+        <a:solidFill>
+          <a:schemeClr val="tx1"/>
+        </a:solidFill>
+        <a:latin typeface="+mn-lt"/>
+        <a:ea typeface="+mn-ea"/>
+        <a:cs typeface="+mn-cs"/>
+      </a:defRPr>
+    </a:lvl3pPr>
+    <a:lvl4pPr marL="1371600" algn="l" defTabSz="914400" rtl="0" eaLnBrk="1" latinLnBrk="0" hangingPunct="1">
+      <a:defRPr sz="1200" kern="1200">
+        <a:solidFill>
+          <a:schemeClr val="tx1"/>
+        </a:solidFill>
+        <a:latin typeface="+mn-lt"/>
+        <a:ea typeface="+mn-ea"/>
+        <a:cs typeface="+mn-cs"/>
+      </a:defRPr>
+    </a:lvl4pPr>
+    <a:lvl5pPr marL="1828800" algn="l" defTabSz="914400" rtl="0" eaLnBrk="1" latinLnBrk="0" hangingPunct="1">
+      <a:defRPr sz="1200" kern="1200">
+        <a:solidFill>
+          <a:schemeClr val="tx1"/>
+        </a:solidFill>
+        <a:latin typeface="+mn-lt"/>
+        <a:ea typeface="+mn-ea"/>
+        <a:cs typeface="+mn-cs"/>
+      </a:defRPr>
+    </a:lvl5pPr>
+    <a:lvl6pPr marL="2286000" algn="l" defTabSz="914400" rtl="0" eaLnBrk="1" latinLnBrk="0" hangingPunct="1">
+      <a:defRPr sz="1200" kern="1200">
+        <a:solidFill>
+          <a:schemeClr val="tx1"/>
+        </a:solidFill>
+        <a:latin typeface="+mn-lt"/>
+        <a:ea typeface="+mn-ea"/>
+        <a:cs typeface="+mn-cs"/>
+      </a:defRPr>
+    </a:lvl6pPr>
+    <a:lvl7pPr marL="2743200" algn="l" defTabSz="914400" rtl="0" eaLnBrk="1" latinLnBrk="0" hangingPunct="1">
+      <a:defRPr sz="1200" kern="1200">
+        <a:solidFill>
+          <a:schemeClr val="tx1"/>
+        </a:solidFill>
+        <a:latin typeface="+mn-lt"/>
+        <a:ea typeface="+mn-ea"/>
+        <a:cs typeface="+mn-cs"/>
+      </a:defRPr>
+    </a:lvl7pPr>
+    <a:lvl8pPr marL="3200400" algn="l" defTabSz="914400" rtl="0" eaLnBrk="1" latinLnBrk="0" hangingPunct="1">
+      <a:defRPr sz="1200" kern="1200">
+        <a:solidFill>
+          <a:schemeClr val="tx1"/>
+        </a:solidFill>
+        <a:latin typeface="+mn-lt"/>
+        <a:ea typeface="+mn-ea"/>
+        <a:cs typeface="+mn-cs"/>
+      </a:defRPr>
+    </a:lvl8pPr>
+    <a:lvl9pPr marL="3657600" algn="l" defTabSz="914400" rtl="0" eaLnBrk="1" latinLnBrk="0" hangingPunct="1">
+      <a:defRPr sz="1200" kern="1200">
+        <a:solidFill>
+          <a:schemeClr val="tx1"/>
+        </a:solidFill>
+        <a:latin typeface="+mn-lt"/>
+        <a:ea typeface="+mn-ea"/>
+        <a:cs typeface="+mn-cs"/>
+      </a:defRPr>
+    </a:lvl9pPr>
+  </p:notesStyle>
+</p:notesMaster>
+</file>
+
+<file path=ppt/notesSlides/notesSlide1.xml><?xml version="1.0" encoding="utf-8"?>
+<p:notes xmlns:a="http://schemas.openxmlformats.org/drawingml/2006/main" xmlns:r="http://schemas.openxmlformats.org/officeDocument/2006/relationships" xmlns:p="http://schemas.openxmlformats.org/presentationml/2006/main">
+  <p:cSld>
+    <p:spTree>
+      <p:nvGrpSpPr>
+        <p:cNvPr id="1" name=""/>
+        <p:cNvGrpSpPr/>
+        <p:nvPr/>
+      </p:nvGrpSpPr>
+      <p:grpSpPr>
+        <a:xfrm>
+          <a:off x="0" y="0"/>
+          <a:ext cx="0" cy="0"/>
+          <a:chOff x="0" y="0"/>
+          <a:chExt cx="0" cy="0"/>
+        </a:xfrm>
+      </p:grpSpPr>
+      <p:sp>
+        <p:nvSpPr>
+          <p:cNvPr id="2" name="Folienbildplatzhalter 1"/>
+          <p:cNvSpPr>
+            <a:spLocks noGrp="1" noRot="1" noChangeAspect="1"/>
+          </p:cNvSpPr>
+          <p:nvPr>
+            <p:ph type="sldImg"/>
+          </p:nvPr>
+        </p:nvSpPr>
+        <p:spPr/>
+      </p:sp>
+      <p:sp>
+        <p:nvSpPr>
+          <p:cNvPr id="3" name="Notizenplatzhalter 2"/>
+          <p:cNvSpPr>
+            <a:spLocks noGrp="1"/>
+          </p:cNvSpPr>
+          <p:nvPr>
+            <p:ph type="body" idx="1"/>
+          </p:nvPr>
+        </p:nvSpPr>
+        <p:spPr/>
+        <p:txBody>
+          <a:bodyPr/>
+          <a:lstStyle/>
+          <a:p>
+            <a:endParaRPr lang="de-DE" dirty="0"/>
+          </a:p>
+        </p:txBody>
+      </p:sp>
+      <p:sp>
+        <p:nvSpPr>
+          <p:cNvPr id="4" name="Foliennummernplatzhalter 3"/>
+          <p:cNvSpPr>
+            <a:spLocks noGrp="1"/>
+          </p:cNvSpPr>
+          <p:nvPr>
+            <p:ph type="sldNum" sz="quarter" idx="5"/>
+          </p:nvPr>
+        </p:nvSpPr>
+        <p:spPr/>
+        <p:txBody>
+          <a:bodyPr/>
+          <a:lstStyle/>
+          <a:p>
+            <a:fld id="{EF4C78AD-A505-42C8-A2CC-46444F9468BB}" type="slidenum">
+              <a:rPr lang="de-DE" smtClean="0"/>
+              <a:t>2</a:t>
+            </a:fld>
+            <a:endParaRPr lang="de-DE"/>
+          </a:p>
+        </p:txBody>
+      </p:sp>
+    </p:spTree>
+    <p:extLst>
+      <p:ext uri="{BB962C8B-B14F-4D97-AF65-F5344CB8AC3E}">
+        <p14:creationId xmlns:p14="http://schemas.microsoft.com/office/powerpoint/2010/main" val="3424498258"/>
+      </p:ext>
+    </p:extLst>
+  </p:cSld>
+  <p:clrMapOvr>
+    <a:masterClrMapping/>
+  </p:clrMapOvr>
+</p:notes>
 </file>
 
 <file path=ppt/slideLayouts/slideLayout1.xml><?xml version="1.0" encoding="utf-8"?>
@@ -254,7 +697,7 @@
           <a:p>
             <a:fld id="{D831276D-45C1-49BF-88B7-62FCB0E02D0F}" type="datetimeFigureOut">
               <a:rPr lang="de-DE" smtClean="0"/>
-              <a:t>11.06.2024</a:t>
+              <a:t>15.06.2024</a:t>
             </a:fld>
             <a:endParaRPr lang="de-DE"/>
           </a:p>
@@ -452,7 +895,7 @@
           <a:p>
             <a:fld id="{D831276D-45C1-49BF-88B7-62FCB0E02D0F}" type="datetimeFigureOut">
               <a:rPr lang="de-DE" smtClean="0"/>
-              <a:t>11.06.2024</a:t>
+              <a:t>15.06.2024</a:t>
             </a:fld>
             <a:endParaRPr lang="de-DE"/>
           </a:p>
@@ -660,7 +1103,7 @@
           <a:p>
             <a:fld id="{D831276D-45C1-49BF-88B7-62FCB0E02D0F}" type="datetimeFigureOut">
               <a:rPr lang="de-DE" smtClean="0"/>
-              <a:t>11.06.2024</a:t>
+              <a:t>15.06.2024</a:t>
             </a:fld>
             <a:endParaRPr lang="de-DE"/>
           </a:p>
@@ -858,7 +1301,7 @@
           <a:p>
             <a:fld id="{D831276D-45C1-49BF-88B7-62FCB0E02D0F}" type="datetimeFigureOut">
               <a:rPr lang="de-DE" smtClean="0"/>
-              <a:t>11.06.2024</a:t>
+              <a:t>15.06.2024</a:t>
             </a:fld>
             <a:endParaRPr lang="de-DE"/>
           </a:p>
@@ -1133,7 +1576,7 @@
           <a:p>
             <a:fld id="{D831276D-45C1-49BF-88B7-62FCB0E02D0F}" type="datetimeFigureOut">
               <a:rPr lang="de-DE" smtClean="0"/>
-              <a:t>11.06.2024</a:t>
+              <a:t>15.06.2024</a:t>
             </a:fld>
             <a:endParaRPr lang="de-DE"/>
           </a:p>
@@ -1398,7 +1841,7 @@
           <a:p>
             <a:fld id="{D831276D-45C1-49BF-88B7-62FCB0E02D0F}" type="datetimeFigureOut">
               <a:rPr lang="de-DE" smtClean="0"/>
-              <a:t>11.06.2024</a:t>
+              <a:t>15.06.2024</a:t>
             </a:fld>
             <a:endParaRPr lang="de-DE"/>
           </a:p>
@@ -1810,7 +2253,7 @@
           <a:p>
             <a:fld id="{D831276D-45C1-49BF-88B7-62FCB0E02D0F}" type="datetimeFigureOut">
               <a:rPr lang="de-DE" smtClean="0"/>
-              <a:t>11.06.2024</a:t>
+              <a:t>15.06.2024</a:t>
             </a:fld>
             <a:endParaRPr lang="de-DE"/>
           </a:p>
@@ -1951,7 +2394,7 @@
           <a:p>
             <a:fld id="{D831276D-45C1-49BF-88B7-62FCB0E02D0F}" type="datetimeFigureOut">
               <a:rPr lang="de-DE" smtClean="0"/>
-              <a:t>11.06.2024</a:t>
+              <a:t>15.06.2024</a:t>
             </a:fld>
             <a:endParaRPr lang="de-DE"/>
           </a:p>
@@ -2064,7 +2507,7 @@
           <a:p>
             <a:fld id="{D831276D-45C1-49BF-88B7-62FCB0E02D0F}" type="datetimeFigureOut">
               <a:rPr lang="de-DE" smtClean="0"/>
-              <a:t>11.06.2024</a:t>
+              <a:t>15.06.2024</a:t>
             </a:fld>
             <a:endParaRPr lang="de-DE"/>
           </a:p>
@@ -2375,7 +2818,7 @@
           <a:p>
             <a:fld id="{D831276D-45C1-49BF-88B7-62FCB0E02D0F}" type="datetimeFigureOut">
               <a:rPr lang="de-DE" smtClean="0"/>
-              <a:t>11.06.2024</a:t>
+              <a:t>15.06.2024</a:t>
             </a:fld>
             <a:endParaRPr lang="de-DE"/>
           </a:p>
@@ -2663,7 +3106,7 @@
           <a:p>
             <a:fld id="{D831276D-45C1-49BF-88B7-62FCB0E02D0F}" type="datetimeFigureOut">
               <a:rPr lang="de-DE" smtClean="0"/>
-              <a:t>11.06.2024</a:t>
+              <a:t>15.06.2024</a:t>
             </a:fld>
             <a:endParaRPr lang="de-DE"/>
           </a:p>
@@ -2904,7 +3347,7 @@
           <a:p>
             <a:fld id="{D831276D-45C1-49BF-88B7-62FCB0E02D0F}" type="datetimeFigureOut">
               <a:rPr lang="de-DE" smtClean="0"/>
-              <a:t>11.06.2024</a:t>
+              <a:t>15.06.2024</a:t>
             </a:fld>
             <a:endParaRPr lang="de-DE"/>
           </a:p>
@@ -3402,6 +3845,1840 @@
     <p:extLst>
       <p:ext uri="{BB962C8B-B14F-4D97-AF65-F5344CB8AC3E}">
         <p14:creationId xmlns:p14="http://schemas.microsoft.com/office/powerpoint/2010/main" val="4260199000"/>
+      </p:ext>
+    </p:extLst>
+  </p:cSld>
+  <p:clrMapOvr>
+    <a:masterClrMapping/>
+  </p:clrMapOvr>
+</p:sld>
+</file>
+
+<file path=ppt/slides/slide2.xml><?xml version="1.0" encoding="utf-8"?>
+<p:sld xmlns:a="http://schemas.openxmlformats.org/drawingml/2006/main" xmlns:r="http://schemas.openxmlformats.org/officeDocument/2006/relationships" xmlns:p="http://schemas.openxmlformats.org/presentationml/2006/main">
+  <p:cSld>
+    <p:spTree>
+      <p:nvGrpSpPr>
+        <p:cNvPr id="1" name=""/>
+        <p:cNvGrpSpPr/>
+        <p:nvPr/>
+      </p:nvGrpSpPr>
+      <p:grpSpPr>
+        <a:xfrm>
+          <a:off x="0" y="0"/>
+          <a:ext cx="0" cy="0"/>
+          <a:chOff x="0" y="0"/>
+          <a:chExt cx="0" cy="0"/>
+        </a:xfrm>
+      </p:grpSpPr>
+      <p:sp>
+        <p:nvSpPr>
+          <p:cNvPr id="28" name="Rechteck 27">
+            <a:extLst>
+              <a:ext uri="{FF2B5EF4-FFF2-40B4-BE49-F238E27FC236}">
+                <a16:creationId xmlns:a16="http://schemas.microsoft.com/office/drawing/2014/main" id="{9288C8D1-D00F-22AC-4A00-66DDB173F627}"/>
+              </a:ext>
+            </a:extLst>
+          </p:cNvPr>
+          <p:cNvSpPr/>
+          <p:nvPr/>
+        </p:nvSpPr>
+        <p:spPr>
+          <a:xfrm>
+            <a:off x="130448" y="19571"/>
+            <a:ext cx="6301946" cy="2988297"/>
+          </a:xfrm>
+          <a:prstGeom prst="rect">
+            <a:avLst/>
+          </a:prstGeom>
+          <a:solidFill>
+            <a:srgbClr val="E8E8E8"/>
+          </a:solidFill>
+          <a:ln>
+            <a:noFill/>
+          </a:ln>
+        </p:spPr>
+        <p:style>
+          <a:lnRef idx="2">
+            <a:schemeClr val="accent1">
+              <a:shade val="15000"/>
+            </a:schemeClr>
+          </a:lnRef>
+          <a:fillRef idx="1">
+            <a:schemeClr val="accent1"/>
+          </a:fillRef>
+          <a:effectRef idx="0">
+            <a:schemeClr val="accent1"/>
+          </a:effectRef>
+          <a:fontRef idx="minor">
+            <a:schemeClr val="lt1"/>
+          </a:fontRef>
+        </p:style>
+        <p:txBody>
+          <a:bodyPr rtlCol="0" anchor="ctr"/>
+          <a:lstStyle/>
+          <a:p>
+            <a:pPr algn="ctr"/>
+            <a:endParaRPr lang="de-DE" dirty="0"/>
+          </a:p>
+        </p:txBody>
+      </p:sp>
+      <p:pic>
+        <p:nvPicPr>
+          <p:cNvPr id="5" name="Grafik 4" descr="Tanz Silhouette">
+            <a:extLst>
+              <a:ext uri="{FF2B5EF4-FFF2-40B4-BE49-F238E27FC236}">
+                <a16:creationId xmlns:a16="http://schemas.microsoft.com/office/drawing/2014/main" id="{5DDDCCAB-90DD-3E3D-1AD4-E4D32E72E405}"/>
+              </a:ext>
+            </a:extLst>
+          </p:cNvPr>
+          <p:cNvPicPr>
+            <a:picLocks noChangeAspect="1"/>
+          </p:cNvPicPr>
+          <p:nvPr/>
+        </p:nvPicPr>
+        <p:blipFill>
+          <a:blip r:embed="rId3">
+            <a:extLst>
+              <a:ext uri="{28A0092B-C50C-407E-A947-70E740481C1C}">
+                <a14:useLocalDpi xmlns:a14="http://schemas.microsoft.com/office/drawing/2010/main" val="0"/>
+              </a:ext>
+              <a:ext uri="{96DAC541-7B7A-43D3-8B79-37D633B846F1}">
+                <asvg:svgBlip xmlns:asvg="http://schemas.microsoft.com/office/drawing/2016/SVG/main" r:embed="rId4"/>
+              </a:ext>
+            </a:extLst>
+          </a:blip>
+          <a:stretch>
+            <a:fillRect/>
+          </a:stretch>
+        </p:blipFill>
+        <p:spPr>
+          <a:xfrm rot="2930293">
+            <a:off x="1122167" y="1082412"/>
+            <a:ext cx="263962" cy="263962"/>
+          </a:xfrm>
+          <a:prstGeom prst="rect">
+            <a:avLst/>
+          </a:prstGeom>
+        </p:spPr>
+      </p:pic>
+      <p:pic>
+        <p:nvPicPr>
+          <p:cNvPr id="7" name="Grafik 6" descr="Champagner Silhouette">
+            <a:extLst>
+              <a:ext uri="{FF2B5EF4-FFF2-40B4-BE49-F238E27FC236}">
+                <a16:creationId xmlns:a16="http://schemas.microsoft.com/office/drawing/2014/main" id="{7FE7805B-ABE7-D3EF-14A0-BEDFE46E9585}"/>
+              </a:ext>
+            </a:extLst>
+          </p:cNvPr>
+          <p:cNvPicPr>
+            <a:picLocks noChangeAspect="1"/>
+          </p:cNvPicPr>
+          <p:nvPr/>
+        </p:nvPicPr>
+        <p:blipFill>
+          <a:blip r:embed="rId5">
+            <a:extLst>
+              <a:ext uri="{28A0092B-C50C-407E-A947-70E740481C1C}">
+                <a14:useLocalDpi xmlns:a14="http://schemas.microsoft.com/office/drawing/2010/main" val="0"/>
+              </a:ext>
+              <a:ext uri="{96DAC541-7B7A-43D3-8B79-37D633B846F1}">
+                <asvg:svgBlip xmlns:asvg="http://schemas.microsoft.com/office/drawing/2016/SVG/main" r:embed="rId6"/>
+              </a:ext>
+            </a:extLst>
+          </a:blip>
+          <a:stretch>
+            <a:fillRect/>
+          </a:stretch>
+        </p:blipFill>
+        <p:spPr>
+          <a:xfrm>
+            <a:off x="3608490" y="1123360"/>
+            <a:ext cx="263962" cy="263962"/>
+          </a:xfrm>
+          <a:prstGeom prst="rect">
+            <a:avLst/>
+          </a:prstGeom>
+        </p:spPr>
+      </p:pic>
+      <p:pic>
+        <p:nvPicPr>
+          <p:cNvPr id="9" name="Grafik 8" descr="Martini Silhouette">
+            <a:extLst>
+              <a:ext uri="{FF2B5EF4-FFF2-40B4-BE49-F238E27FC236}">
+                <a16:creationId xmlns:a16="http://schemas.microsoft.com/office/drawing/2014/main" id="{55166279-47B5-1684-705B-E7AE0B9A581F}"/>
+              </a:ext>
+            </a:extLst>
+          </p:cNvPr>
+          <p:cNvPicPr>
+            <a:picLocks noChangeAspect="1"/>
+          </p:cNvPicPr>
+          <p:nvPr/>
+        </p:nvPicPr>
+        <p:blipFill>
+          <a:blip r:embed="rId7">
+            <a:extLst>
+              <a:ext uri="{28A0092B-C50C-407E-A947-70E740481C1C}">
+                <a14:useLocalDpi xmlns:a14="http://schemas.microsoft.com/office/drawing/2010/main" val="0"/>
+              </a:ext>
+              <a:ext uri="{96DAC541-7B7A-43D3-8B79-37D633B846F1}">
+                <asvg:svgBlip xmlns:asvg="http://schemas.microsoft.com/office/drawing/2016/SVG/main" r:embed="rId8"/>
+              </a:ext>
+            </a:extLst>
+          </a:blip>
+          <a:stretch>
+            <a:fillRect/>
+          </a:stretch>
+        </p:blipFill>
+        <p:spPr>
+          <a:xfrm rot="20562247">
+            <a:off x="388069" y="2093679"/>
+            <a:ext cx="263962" cy="263962"/>
+          </a:xfrm>
+          <a:prstGeom prst="rect">
+            <a:avLst/>
+          </a:prstGeom>
+        </p:spPr>
+      </p:pic>
+      <p:pic>
+        <p:nvPicPr>
+          <p:cNvPr id="11" name="Grafik 10" descr="3D-Brille Silhouette">
+            <a:extLst>
+              <a:ext uri="{FF2B5EF4-FFF2-40B4-BE49-F238E27FC236}">
+                <a16:creationId xmlns:a16="http://schemas.microsoft.com/office/drawing/2014/main" id="{9BBE7174-D06E-3C95-FCD1-AEFA4249E000}"/>
+              </a:ext>
+            </a:extLst>
+          </p:cNvPr>
+          <p:cNvPicPr>
+            <a:picLocks noChangeAspect="1"/>
+          </p:cNvPicPr>
+          <p:nvPr/>
+        </p:nvPicPr>
+        <p:blipFill>
+          <a:blip r:embed="rId9">
+            <a:extLst>
+              <a:ext uri="{28A0092B-C50C-407E-A947-70E740481C1C}">
+                <a14:useLocalDpi xmlns:a14="http://schemas.microsoft.com/office/drawing/2010/main" val="0"/>
+              </a:ext>
+              <a:ext uri="{96DAC541-7B7A-43D3-8B79-37D633B846F1}">
+                <asvg:svgBlip xmlns:asvg="http://schemas.microsoft.com/office/drawing/2016/SVG/main" r:embed="rId10"/>
+              </a:ext>
+            </a:extLst>
+          </a:blip>
+          <a:stretch>
+            <a:fillRect/>
+          </a:stretch>
+        </p:blipFill>
+        <p:spPr>
+          <a:xfrm rot="17959380">
+            <a:off x="3946000" y="136881"/>
+            <a:ext cx="263962" cy="263962"/>
+          </a:xfrm>
+          <a:prstGeom prst="rect">
+            <a:avLst/>
+          </a:prstGeom>
+        </p:spPr>
+      </p:pic>
+      <p:pic>
+        <p:nvPicPr>
+          <p:cNvPr id="13" name="Grafik 12" descr="Kokosnuss Silhouette">
+            <a:extLst>
+              <a:ext uri="{FF2B5EF4-FFF2-40B4-BE49-F238E27FC236}">
+                <a16:creationId xmlns:a16="http://schemas.microsoft.com/office/drawing/2014/main" id="{91C2F7F2-5F8B-B2B0-2EE7-1DCB39D2E1A2}"/>
+              </a:ext>
+            </a:extLst>
+          </p:cNvPr>
+          <p:cNvPicPr>
+            <a:picLocks noChangeAspect="1"/>
+          </p:cNvPicPr>
+          <p:nvPr/>
+        </p:nvPicPr>
+        <p:blipFill>
+          <a:blip r:embed="rId11">
+            <a:extLst>
+              <a:ext uri="{28A0092B-C50C-407E-A947-70E740481C1C}">
+                <a14:useLocalDpi xmlns:a14="http://schemas.microsoft.com/office/drawing/2010/main" val="0"/>
+              </a:ext>
+              <a:ext uri="{96DAC541-7B7A-43D3-8B79-37D633B846F1}">
+                <asvg:svgBlip xmlns:asvg="http://schemas.microsoft.com/office/drawing/2016/SVG/main" r:embed="rId12"/>
+              </a:ext>
+            </a:extLst>
+          </a:blip>
+          <a:stretch>
+            <a:fillRect/>
+          </a:stretch>
+        </p:blipFill>
+        <p:spPr>
+          <a:xfrm rot="19502185">
+            <a:off x="4840946" y="1229389"/>
+            <a:ext cx="263962" cy="263962"/>
+          </a:xfrm>
+          <a:prstGeom prst="rect">
+            <a:avLst/>
+          </a:prstGeom>
+        </p:spPr>
+      </p:pic>
+      <p:grpSp>
+        <p:nvGrpSpPr>
+          <p:cNvPr id="19" name="Gruppieren 18">
+            <a:extLst>
+              <a:ext uri="{FF2B5EF4-FFF2-40B4-BE49-F238E27FC236}">
+                <a16:creationId xmlns:a16="http://schemas.microsoft.com/office/drawing/2014/main" id="{747A704D-85A1-5BBB-A479-4F979ED633D2}"/>
+              </a:ext>
+            </a:extLst>
+          </p:cNvPr>
+          <p:cNvGrpSpPr/>
+          <p:nvPr/>
+        </p:nvGrpSpPr>
+        <p:grpSpPr>
+          <a:xfrm>
+            <a:off x="2503066" y="387763"/>
+            <a:ext cx="579401" cy="400302"/>
+            <a:chOff x="7720555" y="3714161"/>
+            <a:chExt cx="702819" cy="523221"/>
+          </a:xfrm>
+        </p:grpSpPr>
+        <p:sp>
+          <p:nvSpPr>
+            <p:cNvPr id="14" name="Textfeld 13">
+              <a:extLst>
+                <a:ext uri="{FF2B5EF4-FFF2-40B4-BE49-F238E27FC236}">
+                  <a16:creationId xmlns:a16="http://schemas.microsoft.com/office/drawing/2014/main" id="{F6984CF7-AD4F-DB84-1AE6-5458F9D5E589}"/>
+                </a:ext>
+              </a:extLst>
+            </p:cNvPr>
+            <p:cNvSpPr txBox="1"/>
+            <p:nvPr/>
+          </p:nvSpPr>
+          <p:spPr>
+            <a:xfrm>
+              <a:off x="7754072" y="3804185"/>
+              <a:ext cx="669302" cy="362056"/>
+            </a:xfrm>
+            <a:prstGeom prst="rect">
+              <a:avLst/>
+            </a:prstGeom>
+            <a:noFill/>
+            <a:ln w="12700">
+              <a:noFill/>
+            </a:ln>
+          </p:spPr>
+          <p:txBody>
+            <a:bodyPr wrap="square" rtlCol="0">
+              <a:spAutoFit/>
+            </a:bodyPr>
+            <a:lstStyle/>
+            <a:p>
+              <a:r>
+                <a:rPr lang="de-DE" sz="1200" dirty="0">
+                  <a:solidFill>
+                    <a:schemeClr val="accent2">
+                      <a:lumMod val="40000"/>
+                      <a:lumOff val="60000"/>
+                    </a:schemeClr>
+                  </a:solidFill>
+                  <a:latin typeface="Blackadder ITC" panose="04020505051007020D02" pitchFamily="82" charset="0"/>
+                </a:rPr>
+                <a:t>H</a:t>
+              </a:r>
+            </a:p>
+          </p:txBody>
+        </p:sp>
+        <p:sp>
+          <p:nvSpPr>
+            <p:cNvPr id="18" name="Ellipse 17">
+              <a:extLst>
+                <a:ext uri="{FF2B5EF4-FFF2-40B4-BE49-F238E27FC236}">
+                  <a16:creationId xmlns:a16="http://schemas.microsoft.com/office/drawing/2014/main" id="{F8C789CB-E89D-589F-4EA7-54B8722308D2}"/>
+                </a:ext>
+              </a:extLst>
+            </p:cNvPr>
+            <p:cNvSpPr/>
+            <p:nvPr/>
+          </p:nvSpPr>
+          <p:spPr>
+            <a:xfrm>
+              <a:off x="7720555" y="3714161"/>
+              <a:ext cx="499620" cy="523221"/>
+            </a:xfrm>
+            <a:prstGeom prst="ellipse">
+              <a:avLst/>
+            </a:prstGeom>
+            <a:noFill/>
+            <a:ln w="12700">
+              <a:solidFill>
+                <a:schemeClr val="accent2">
+                  <a:lumMod val="40000"/>
+                  <a:lumOff val="60000"/>
+                </a:schemeClr>
+              </a:solidFill>
+            </a:ln>
+          </p:spPr>
+          <p:style>
+            <a:lnRef idx="2">
+              <a:schemeClr val="accent1">
+                <a:shade val="15000"/>
+              </a:schemeClr>
+            </a:lnRef>
+            <a:fillRef idx="1">
+              <a:schemeClr val="accent1"/>
+            </a:fillRef>
+            <a:effectRef idx="0">
+              <a:schemeClr val="accent1"/>
+            </a:effectRef>
+            <a:fontRef idx="minor">
+              <a:schemeClr val="lt1"/>
+            </a:fontRef>
+          </p:style>
+          <p:txBody>
+            <a:bodyPr rtlCol="0" anchor="ctr"/>
+            <a:lstStyle/>
+            <a:p>
+              <a:pPr algn="ctr"/>
+              <a:endParaRPr lang="de-DE">
+                <a:solidFill>
+                  <a:schemeClr val="accent2">
+                    <a:lumMod val="40000"/>
+                    <a:lumOff val="60000"/>
+                  </a:schemeClr>
+                </a:solidFill>
+              </a:endParaRPr>
+            </a:p>
+          </p:txBody>
+        </p:sp>
+      </p:grpSp>
+      <p:grpSp>
+        <p:nvGrpSpPr>
+          <p:cNvPr id="21" name="Gruppieren 20">
+            <a:extLst>
+              <a:ext uri="{FF2B5EF4-FFF2-40B4-BE49-F238E27FC236}">
+                <a16:creationId xmlns:a16="http://schemas.microsoft.com/office/drawing/2014/main" id="{2AB6667C-2801-DCA2-80F6-2949B102D007}"/>
+              </a:ext>
+            </a:extLst>
+          </p:cNvPr>
+          <p:cNvGrpSpPr/>
+          <p:nvPr/>
+        </p:nvGrpSpPr>
+        <p:grpSpPr>
+          <a:xfrm>
+            <a:off x="4210364" y="2093677"/>
+            <a:ext cx="456660" cy="276999"/>
+            <a:chOff x="6636052" y="5094781"/>
+            <a:chExt cx="746941" cy="474834"/>
+          </a:xfrm>
+        </p:grpSpPr>
+        <p:sp>
+          <p:nvSpPr>
+            <p:cNvPr id="15" name="Textfeld 14">
+              <a:extLst>
+                <a:ext uri="{FF2B5EF4-FFF2-40B4-BE49-F238E27FC236}">
+                  <a16:creationId xmlns:a16="http://schemas.microsoft.com/office/drawing/2014/main" id="{28DEB701-7865-A005-5D9D-48184389E683}"/>
+                </a:ext>
+              </a:extLst>
+            </p:cNvPr>
+            <p:cNvSpPr txBox="1"/>
+            <p:nvPr/>
+          </p:nvSpPr>
+          <p:spPr>
+            <a:xfrm>
+              <a:off x="6636052" y="5094781"/>
+              <a:ext cx="746941" cy="474834"/>
+            </a:xfrm>
+            <a:prstGeom prst="rect">
+              <a:avLst/>
+            </a:prstGeom>
+            <a:noFill/>
+            <a:ln w="12700">
+              <a:noFill/>
+            </a:ln>
+          </p:spPr>
+          <p:txBody>
+            <a:bodyPr wrap="square" rtlCol="0">
+              <a:spAutoFit/>
+            </a:bodyPr>
+            <a:lstStyle/>
+            <a:p>
+              <a:r>
+                <a:rPr lang="de-DE" sz="1200" dirty="0">
+                  <a:solidFill>
+                    <a:schemeClr val="accent2">
+                      <a:lumMod val="40000"/>
+                      <a:lumOff val="60000"/>
+                    </a:schemeClr>
+                  </a:solidFill>
+                  <a:latin typeface="Agency FB" panose="020B0503020202020204" pitchFamily="34" charset="0"/>
+                </a:rPr>
+                <a:t>RGB</a:t>
+              </a:r>
+              <a:endParaRPr lang="de-DE" sz="2800" dirty="0">
+                <a:solidFill>
+                  <a:schemeClr val="accent2">
+                    <a:lumMod val="40000"/>
+                    <a:lumOff val="60000"/>
+                  </a:schemeClr>
+                </a:solidFill>
+                <a:latin typeface="Agency FB" panose="020B0503020202020204" pitchFamily="34" charset="0"/>
+              </a:endParaRPr>
+            </a:p>
+          </p:txBody>
+        </p:sp>
+        <p:sp>
+          <p:nvSpPr>
+            <p:cNvPr id="20" name="Rechteck: abgerundete Ecken 19">
+              <a:extLst>
+                <a:ext uri="{FF2B5EF4-FFF2-40B4-BE49-F238E27FC236}">
+                  <a16:creationId xmlns:a16="http://schemas.microsoft.com/office/drawing/2014/main" id="{5F5FFEEE-014D-88A2-443F-E14C5787BBB2}"/>
+                </a:ext>
+              </a:extLst>
+            </p:cNvPr>
+            <p:cNvSpPr/>
+            <p:nvPr/>
+          </p:nvSpPr>
+          <p:spPr>
+            <a:xfrm>
+              <a:off x="6650658" y="5109329"/>
+              <a:ext cx="558670" cy="452486"/>
+            </a:xfrm>
+            <a:prstGeom prst="roundRect">
+              <a:avLst/>
+            </a:prstGeom>
+            <a:noFill/>
+            <a:ln w="12700">
+              <a:solidFill>
+                <a:schemeClr val="accent2">
+                  <a:lumMod val="40000"/>
+                  <a:lumOff val="60000"/>
+                </a:schemeClr>
+              </a:solidFill>
+            </a:ln>
+          </p:spPr>
+          <p:style>
+            <a:lnRef idx="2">
+              <a:schemeClr val="accent1">
+                <a:shade val="15000"/>
+              </a:schemeClr>
+            </a:lnRef>
+            <a:fillRef idx="1">
+              <a:schemeClr val="accent1"/>
+            </a:fillRef>
+            <a:effectRef idx="0">
+              <a:schemeClr val="accent1"/>
+            </a:effectRef>
+            <a:fontRef idx="minor">
+              <a:schemeClr val="lt1"/>
+            </a:fontRef>
+          </p:style>
+          <p:txBody>
+            <a:bodyPr rtlCol="0" anchor="ctr"/>
+            <a:lstStyle/>
+            <a:p>
+              <a:pPr algn="ctr"/>
+              <a:endParaRPr lang="de-DE">
+                <a:solidFill>
+                  <a:schemeClr val="accent2">
+                    <a:lumMod val="40000"/>
+                    <a:lumOff val="60000"/>
+                  </a:schemeClr>
+                </a:solidFill>
+              </a:endParaRPr>
+            </a:p>
+          </p:txBody>
+        </p:sp>
+      </p:grpSp>
+      <p:pic>
+        <p:nvPicPr>
+          <p:cNvPr id="22" name="Grafik 21" descr="Martini Silhouette">
+            <a:extLst>
+              <a:ext uri="{FF2B5EF4-FFF2-40B4-BE49-F238E27FC236}">
+                <a16:creationId xmlns:a16="http://schemas.microsoft.com/office/drawing/2014/main" id="{6F03C166-0C7A-19B2-E46F-8E28309AC363}"/>
+              </a:ext>
+            </a:extLst>
+          </p:cNvPr>
+          <p:cNvPicPr>
+            <a:picLocks noChangeAspect="1"/>
+          </p:cNvPicPr>
+          <p:nvPr/>
+        </p:nvPicPr>
+        <p:blipFill>
+          <a:blip r:embed="rId7">
+            <a:extLst>
+              <a:ext uri="{28A0092B-C50C-407E-A947-70E740481C1C}">
+                <a14:useLocalDpi xmlns:a14="http://schemas.microsoft.com/office/drawing/2010/main" val="0"/>
+              </a:ext>
+              <a:ext uri="{96DAC541-7B7A-43D3-8B79-37D633B846F1}">
+                <asvg:svgBlip xmlns:asvg="http://schemas.microsoft.com/office/drawing/2016/SVG/main" r:embed="rId8"/>
+              </a:ext>
+            </a:extLst>
+          </a:blip>
+          <a:stretch>
+            <a:fillRect/>
+          </a:stretch>
+        </p:blipFill>
+        <p:spPr>
+          <a:xfrm rot="2444182">
+            <a:off x="2972734" y="1741463"/>
+            <a:ext cx="263962" cy="263962"/>
+          </a:xfrm>
+          <a:prstGeom prst="rect">
+            <a:avLst/>
+          </a:prstGeom>
+        </p:spPr>
+      </p:pic>
+      <p:pic>
+        <p:nvPicPr>
+          <p:cNvPr id="23" name="Grafik 22" descr="Martini Silhouette">
+            <a:extLst>
+              <a:ext uri="{FF2B5EF4-FFF2-40B4-BE49-F238E27FC236}">
+                <a16:creationId xmlns:a16="http://schemas.microsoft.com/office/drawing/2014/main" id="{CCDB3760-CD4F-87FA-E296-22C091E8A6ED}"/>
+              </a:ext>
+            </a:extLst>
+          </p:cNvPr>
+          <p:cNvPicPr>
+            <a:picLocks noChangeAspect="1"/>
+          </p:cNvPicPr>
+          <p:nvPr/>
+        </p:nvPicPr>
+        <p:blipFill>
+          <a:blip r:embed="rId7">
+            <a:extLst>
+              <a:ext uri="{28A0092B-C50C-407E-A947-70E740481C1C}">
+                <a14:useLocalDpi xmlns:a14="http://schemas.microsoft.com/office/drawing/2010/main" val="0"/>
+              </a:ext>
+              <a:ext uri="{96DAC541-7B7A-43D3-8B79-37D633B846F1}">
+                <asvg:svgBlip xmlns:asvg="http://schemas.microsoft.com/office/drawing/2016/SVG/main" r:embed="rId8"/>
+              </a:ext>
+            </a:extLst>
+          </a:blip>
+          <a:stretch>
+            <a:fillRect/>
+          </a:stretch>
+        </p:blipFill>
+        <p:spPr>
+          <a:xfrm>
+            <a:off x="1467395" y="200036"/>
+            <a:ext cx="263962" cy="263962"/>
+          </a:xfrm>
+          <a:prstGeom prst="rect">
+            <a:avLst/>
+          </a:prstGeom>
+        </p:spPr>
+      </p:pic>
+      <p:pic>
+        <p:nvPicPr>
+          <p:cNvPr id="24" name="Grafik 23" descr="Kokosnuss Silhouette">
+            <a:extLst>
+              <a:ext uri="{FF2B5EF4-FFF2-40B4-BE49-F238E27FC236}">
+                <a16:creationId xmlns:a16="http://schemas.microsoft.com/office/drawing/2014/main" id="{B810B21E-7B1C-0CD1-2CB6-CF98C66AA06A}"/>
+              </a:ext>
+            </a:extLst>
+          </p:cNvPr>
+          <p:cNvPicPr>
+            <a:picLocks noChangeAspect="1"/>
+          </p:cNvPicPr>
+          <p:nvPr/>
+        </p:nvPicPr>
+        <p:blipFill>
+          <a:blip r:embed="rId11">
+            <a:extLst>
+              <a:ext uri="{28A0092B-C50C-407E-A947-70E740481C1C}">
+                <a14:useLocalDpi xmlns:a14="http://schemas.microsoft.com/office/drawing/2010/main" val="0"/>
+              </a:ext>
+              <a:ext uri="{96DAC541-7B7A-43D3-8B79-37D633B846F1}">
+                <asvg:svgBlip xmlns:asvg="http://schemas.microsoft.com/office/drawing/2016/SVG/main" r:embed="rId12"/>
+              </a:ext>
+            </a:extLst>
+          </a:blip>
+          <a:stretch>
+            <a:fillRect/>
+          </a:stretch>
+        </p:blipFill>
+        <p:spPr>
+          <a:xfrm rot="1386669">
+            <a:off x="513787" y="594667"/>
+            <a:ext cx="263962" cy="263962"/>
+          </a:xfrm>
+          <a:prstGeom prst="rect">
+            <a:avLst/>
+          </a:prstGeom>
+        </p:spPr>
+      </p:pic>
+      <p:pic>
+        <p:nvPicPr>
+          <p:cNvPr id="25" name="Grafik 24" descr="Champagner Silhouette">
+            <a:extLst>
+              <a:ext uri="{FF2B5EF4-FFF2-40B4-BE49-F238E27FC236}">
+                <a16:creationId xmlns:a16="http://schemas.microsoft.com/office/drawing/2014/main" id="{E24D91CB-872D-E427-C551-BEF804AC4C06}"/>
+              </a:ext>
+            </a:extLst>
+          </p:cNvPr>
+          <p:cNvPicPr>
+            <a:picLocks noChangeAspect="1"/>
+          </p:cNvPicPr>
+          <p:nvPr/>
+        </p:nvPicPr>
+        <p:blipFill>
+          <a:blip r:embed="rId5">
+            <a:extLst>
+              <a:ext uri="{28A0092B-C50C-407E-A947-70E740481C1C}">
+                <a14:useLocalDpi xmlns:a14="http://schemas.microsoft.com/office/drawing/2010/main" val="0"/>
+              </a:ext>
+              <a:ext uri="{96DAC541-7B7A-43D3-8B79-37D633B846F1}">
+                <asvg:svgBlip xmlns:asvg="http://schemas.microsoft.com/office/drawing/2016/SVG/main" r:embed="rId6"/>
+              </a:ext>
+            </a:extLst>
+          </a:blip>
+          <a:stretch>
+            <a:fillRect/>
+          </a:stretch>
+        </p:blipFill>
+        <p:spPr>
+          <a:xfrm rot="20012074">
+            <a:off x="5835362" y="2208047"/>
+            <a:ext cx="263962" cy="263962"/>
+          </a:xfrm>
+          <a:prstGeom prst="rect">
+            <a:avLst/>
+          </a:prstGeom>
+        </p:spPr>
+      </p:pic>
+      <p:pic>
+        <p:nvPicPr>
+          <p:cNvPr id="26" name="Grafik 25" descr="Tanz Silhouette">
+            <a:extLst>
+              <a:ext uri="{FF2B5EF4-FFF2-40B4-BE49-F238E27FC236}">
+                <a16:creationId xmlns:a16="http://schemas.microsoft.com/office/drawing/2014/main" id="{DB0B2603-4445-0CE0-DA11-DF45CE162FDA}"/>
+              </a:ext>
+            </a:extLst>
+          </p:cNvPr>
+          <p:cNvPicPr>
+            <a:picLocks noChangeAspect="1"/>
+          </p:cNvPicPr>
+          <p:nvPr/>
+        </p:nvPicPr>
+        <p:blipFill>
+          <a:blip r:embed="rId3">
+            <a:extLst>
+              <a:ext uri="{28A0092B-C50C-407E-A947-70E740481C1C}">
+                <a14:useLocalDpi xmlns:a14="http://schemas.microsoft.com/office/drawing/2010/main" val="0"/>
+              </a:ext>
+              <a:ext uri="{96DAC541-7B7A-43D3-8B79-37D633B846F1}">
+                <asvg:svgBlip xmlns:asvg="http://schemas.microsoft.com/office/drawing/2016/SVG/main" r:embed="rId4"/>
+              </a:ext>
+            </a:extLst>
+          </a:blip>
+          <a:stretch>
+            <a:fillRect/>
+          </a:stretch>
+        </p:blipFill>
+        <p:spPr>
+          <a:xfrm>
+            <a:off x="5285544" y="321481"/>
+            <a:ext cx="263962" cy="263962"/>
+          </a:xfrm>
+          <a:prstGeom prst="rect">
+            <a:avLst/>
+          </a:prstGeom>
+        </p:spPr>
+      </p:pic>
+      <p:pic>
+        <p:nvPicPr>
+          <p:cNvPr id="27" name="Grafik 26" descr="3D-Brille Silhouette">
+            <a:extLst>
+              <a:ext uri="{FF2B5EF4-FFF2-40B4-BE49-F238E27FC236}">
+                <a16:creationId xmlns:a16="http://schemas.microsoft.com/office/drawing/2014/main" id="{91FA7EA9-BB73-9B78-499E-534AB6874AFE}"/>
+              </a:ext>
+            </a:extLst>
+          </p:cNvPr>
+          <p:cNvPicPr>
+            <a:picLocks noChangeAspect="1"/>
+          </p:cNvPicPr>
+          <p:nvPr/>
+        </p:nvPicPr>
+        <p:blipFill>
+          <a:blip r:embed="rId9">
+            <a:extLst>
+              <a:ext uri="{28A0092B-C50C-407E-A947-70E740481C1C}">
+                <a14:useLocalDpi xmlns:a14="http://schemas.microsoft.com/office/drawing/2010/main" val="0"/>
+              </a:ext>
+              <a:ext uri="{96DAC541-7B7A-43D3-8B79-37D633B846F1}">
+                <asvg:svgBlip xmlns:asvg="http://schemas.microsoft.com/office/drawing/2016/SVG/main" r:embed="rId10"/>
+              </a:ext>
+            </a:extLst>
+          </a:blip>
+          <a:stretch>
+            <a:fillRect/>
+          </a:stretch>
+        </p:blipFill>
+        <p:spPr>
+          <a:xfrm>
+            <a:off x="1876229" y="1627652"/>
+            <a:ext cx="263962" cy="263962"/>
+          </a:xfrm>
+          <a:prstGeom prst="rect">
+            <a:avLst/>
+          </a:prstGeom>
+        </p:spPr>
+      </p:pic>
+      <p:pic>
+        <p:nvPicPr>
+          <p:cNvPr id="33" name="Grafik 32" descr="Sterne Silhouette">
+            <a:extLst>
+              <a:ext uri="{FF2B5EF4-FFF2-40B4-BE49-F238E27FC236}">
+                <a16:creationId xmlns:a16="http://schemas.microsoft.com/office/drawing/2014/main" id="{963D420F-64C1-2D09-DD1C-ED03129F134F}"/>
+              </a:ext>
+            </a:extLst>
+          </p:cNvPr>
+          <p:cNvPicPr>
+            <a:picLocks noChangeAspect="1"/>
+          </p:cNvPicPr>
+          <p:nvPr/>
+        </p:nvPicPr>
+        <p:blipFill>
+          <a:blip r:embed="rId13">
+            <a:extLst>
+              <a:ext uri="{28A0092B-C50C-407E-A947-70E740481C1C}">
+                <a14:useLocalDpi xmlns:a14="http://schemas.microsoft.com/office/drawing/2010/main" val="0"/>
+              </a:ext>
+              <a:ext uri="{96DAC541-7B7A-43D3-8B79-37D633B846F1}">
+                <asvg:svgBlip xmlns:asvg="http://schemas.microsoft.com/office/drawing/2016/SVG/main" r:embed="rId14"/>
+              </a:ext>
+            </a:extLst>
+          </a:blip>
+          <a:stretch>
+            <a:fillRect/>
+          </a:stretch>
+        </p:blipFill>
+        <p:spPr>
+          <a:xfrm rot="19137061">
+            <a:off x="1270815" y="1970183"/>
+            <a:ext cx="263962" cy="263962"/>
+          </a:xfrm>
+          <a:prstGeom prst="rect">
+            <a:avLst/>
+          </a:prstGeom>
+        </p:spPr>
+      </p:pic>
+      <p:pic>
+        <p:nvPicPr>
+          <p:cNvPr id="34" name="Grafik 33" descr="Wassermann Silhouette">
+            <a:extLst>
+              <a:ext uri="{FF2B5EF4-FFF2-40B4-BE49-F238E27FC236}">
+                <a16:creationId xmlns:a16="http://schemas.microsoft.com/office/drawing/2014/main" id="{519CFA41-9610-2CED-F0C0-162EE318C983}"/>
+              </a:ext>
+            </a:extLst>
+          </p:cNvPr>
+          <p:cNvPicPr>
+            <a:picLocks noChangeAspect="1"/>
+          </p:cNvPicPr>
+          <p:nvPr/>
+        </p:nvPicPr>
+        <p:blipFill>
+          <a:blip r:embed="rId15">
+            <a:extLst>
+              <a:ext uri="{28A0092B-C50C-407E-A947-70E740481C1C}">
+                <a14:useLocalDpi xmlns:a14="http://schemas.microsoft.com/office/drawing/2010/main" val="0"/>
+              </a:ext>
+              <a:ext uri="{96DAC541-7B7A-43D3-8B79-37D633B846F1}">
+                <asvg:svgBlip xmlns:asvg="http://schemas.microsoft.com/office/drawing/2016/SVG/main" r:embed="rId16"/>
+              </a:ext>
+            </a:extLst>
+          </a:blip>
+          <a:stretch>
+            <a:fillRect/>
+          </a:stretch>
+        </p:blipFill>
+        <p:spPr>
+          <a:xfrm rot="1889291">
+            <a:off x="4174732" y="616499"/>
+            <a:ext cx="263962" cy="263962"/>
+          </a:xfrm>
+          <a:prstGeom prst="rect">
+            <a:avLst/>
+          </a:prstGeom>
+        </p:spPr>
+      </p:pic>
+      <p:cxnSp>
+        <p:nvCxnSpPr>
+          <p:cNvPr id="36" name="Gerader Verbinder 35">
+            <a:extLst>
+              <a:ext uri="{FF2B5EF4-FFF2-40B4-BE49-F238E27FC236}">
+                <a16:creationId xmlns:a16="http://schemas.microsoft.com/office/drawing/2014/main" id="{8517DF0F-36F8-3BD9-0780-673D23173A0E}"/>
+              </a:ext>
+            </a:extLst>
+          </p:cNvPr>
+          <p:cNvCxnSpPr>
+            <a:cxnSpLocks/>
+          </p:cNvCxnSpPr>
+          <p:nvPr/>
+        </p:nvCxnSpPr>
+        <p:spPr>
+          <a:xfrm flipH="1">
+            <a:off x="1915118" y="475099"/>
+            <a:ext cx="31868" cy="187559"/>
+          </a:xfrm>
+          <a:prstGeom prst="line">
+            <a:avLst/>
+          </a:prstGeom>
+          <a:ln w="6350">
+            <a:solidFill>
+              <a:schemeClr val="accent2">
+                <a:lumMod val="40000"/>
+                <a:lumOff val="60000"/>
+              </a:schemeClr>
+            </a:solidFill>
+          </a:ln>
+        </p:spPr>
+        <p:style>
+          <a:lnRef idx="2">
+            <a:schemeClr val="accent1"/>
+          </a:lnRef>
+          <a:fillRef idx="0">
+            <a:schemeClr val="accent1"/>
+          </a:fillRef>
+          <a:effectRef idx="1">
+            <a:schemeClr val="accent1"/>
+          </a:effectRef>
+          <a:fontRef idx="minor">
+            <a:schemeClr val="tx1"/>
+          </a:fontRef>
+        </p:style>
+      </p:cxnSp>
+      <p:cxnSp>
+        <p:nvCxnSpPr>
+          <p:cNvPr id="37" name="Gerader Verbinder 36">
+            <a:extLst>
+              <a:ext uri="{FF2B5EF4-FFF2-40B4-BE49-F238E27FC236}">
+                <a16:creationId xmlns:a16="http://schemas.microsoft.com/office/drawing/2014/main" id="{F7498540-1E00-DCCF-188A-E9217AE28DF5}"/>
+              </a:ext>
+            </a:extLst>
+          </p:cNvPr>
+          <p:cNvCxnSpPr>
+            <a:cxnSpLocks/>
+          </p:cNvCxnSpPr>
+          <p:nvPr/>
+        </p:nvCxnSpPr>
+        <p:spPr>
+          <a:xfrm>
+            <a:off x="5854219" y="1450895"/>
+            <a:ext cx="96632" cy="253670"/>
+          </a:xfrm>
+          <a:prstGeom prst="line">
+            <a:avLst/>
+          </a:prstGeom>
+          <a:ln w="6350">
+            <a:solidFill>
+              <a:schemeClr val="accent2">
+                <a:lumMod val="40000"/>
+                <a:lumOff val="60000"/>
+              </a:schemeClr>
+            </a:solidFill>
+          </a:ln>
+        </p:spPr>
+        <p:style>
+          <a:lnRef idx="2">
+            <a:schemeClr val="accent1"/>
+          </a:lnRef>
+          <a:fillRef idx="0">
+            <a:schemeClr val="accent1"/>
+          </a:fillRef>
+          <a:effectRef idx="1">
+            <a:schemeClr val="accent1"/>
+          </a:effectRef>
+          <a:fontRef idx="minor">
+            <a:schemeClr val="tx1"/>
+          </a:fontRef>
+        </p:style>
+      </p:cxnSp>
+      <p:cxnSp>
+        <p:nvCxnSpPr>
+          <p:cNvPr id="38" name="Gerader Verbinder 37">
+            <a:extLst>
+              <a:ext uri="{FF2B5EF4-FFF2-40B4-BE49-F238E27FC236}">
+                <a16:creationId xmlns:a16="http://schemas.microsoft.com/office/drawing/2014/main" id="{A6B8D648-43ED-5889-0322-E45B567F9F69}"/>
+              </a:ext>
+            </a:extLst>
+          </p:cNvPr>
+          <p:cNvCxnSpPr/>
+          <p:nvPr/>
+        </p:nvCxnSpPr>
+        <p:spPr>
+          <a:xfrm>
+            <a:off x="3043142" y="346846"/>
+            <a:ext cx="197962" cy="183794"/>
+          </a:xfrm>
+          <a:prstGeom prst="line">
+            <a:avLst/>
+          </a:prstGeom>
+          <a:ln w="6350">
+            <a:solidFill>
+              <a:schemeClr val="accent2">
+                <a:lumMod val="40000"/>
+                <a:lumOff val="60000"/>
+              </a:schemeClr>
+            </a:solidFill>
+          </a:ln>
+        </p:spPr>
+        <p:style>
+          <a:lnRef idx="2">
+            <a:schemeClr val="accent1"/>
+          </a:lnRef>
+          <a:fillRef idx="0">
+            <a:schemeClr val="accent1"/>
+          </a:fillRef>
+          <a:effectRef idx="1">
+            <a:schemeClr val="accent1"/>
+          </a:effectRef>
+          <a:fontRef idx="minor">
+            <a:schemeClr val="tx1"/>
+          </a:fontRef>
+        </p:style>
+      </p:cxnSp>
+      <p:cxnSp>
+        <p:nvCxnSpPr>
+          <p:cNvPr id="39" name="Gerader Verbinder 38">
+            <a:extLst>
+              <a:ext uri="{FF2B5EF4-FFF2-40B4-BE49-F238E27FC236}">
+                <a16:creationId xmlns:a16="http://schemas.microsoft.com/office/drawing/2014/main" id="{B98062F7-30F6-DB6C-C462-E6AAF2C62D49}"/>
+              </a:ext>
+            </a:extLst>
+          </p:cNvPr>
+          <p:cNvCxnSpPr>
+            <a:cxnSpLocks/>
+          </p:cNvCxnSpPr>
+          <p:nvPr/>
+        </p:nvCxnSpPr>
+        <p:spPr>
+          <a:xfrm flipV="1">
+            <a:off x="4950753" y="135243"/>
+            <a:ext cx="88159" cy="79339"/>
+          </a:xfrm>
+          <a:prstGeom prst="line">
+            <a:avLst/>
+          </a:prstGeom>
+          <a:ln w="6350">
+            <a:solidFill>
+              <a:schemeClr val="accent2">
+                <a:lumMod val="40000"/>
+                <a:lumOff val="60000"/>
+              </a:schemeClr>
+            </a:solidFill>
+          </a:ln>
+        </p:spPr>
+        <p:style>
+          <a:lnRef idx="2">
+            <a:schemeClr val="accent1"/>
+          </a:lnRef>
+          <a:fillRef idx="0">
+            <a:schemeClr val="accent1"/>
+          </a:fillRef>
+          <a:effectRef idx="1">
+            <a:schemeClr val="accent1"/>
+          </a:effectRef>
+          <a:fontRef idx="minor">
+            <a:schemeClr val="tx1"/>
+          </a:fontRef>
+        </p:style>
+      </p:cxnSp>
+      <p:cxnSp>
+        <p:nvCxnSpPr>
+          <p:cNvPr id="46" name="Gerader Verbinder 45">
+            <a:extLst>
+              <a:ext uri="{FF2B5EF4-FFF2-40B4-BE49-F238E27FC236}">
+                <a16:creationId xmlns:a16="http://schemas.microsoft.com/office/drawing/2014/main" id="{369D77EC-1C79-FF56-59E5-639F31FFA933}"/>
+              </a:ext>
+            </a:extLst>
+          </p:cNvPr>
+          <p:cNvCxnSpPr>
+            <a:cxnSpLocks/>
+          </p:cNvCxnSpPr>
+          <p:nvPr/>
+        </p:nvCxnSpPr>
+        <p:spPr>
+          <a:xfrm flipH="1">
+            <a:off x="1339469" y="1533872"/>
+            <a:ext cx="31868" cy="187559"/>
+          </a:xfrm>
+          <a:prstGeom prst="line">
+            <a:avLst/>
+          </a:prstGeom>
+          <a:ln w="6350">
+            <a:solidFill>
+              <a:schemeClr val="accent2">
+                <a:lumMod val="40000"/>
+                <a:lumOff val="60000"/>
+              </a:schemeClr>
+            </a:solidFill>
+          </a:ln>
+        </p:spPr>
+        <p:style>
+          <a:lnRef idx="2">
+            <a:schemeClr val="accent1"/>
+          </a:lnRef>
+          <a:fillRef idx="0">
+            <a:schemeClr val="accent1"/>
+          </a:fillRef>
+          <a:effectRef idx="1">
+            <a:schemeClr val="accent1"/>
+          </a:effectRef>
+          <a:fontRef idx="minor">
+            <a:schemeClr val="tx1"/>
+          </a:fontRef>
+        </p:style>
+      </p:cxnSp>
+      <p:cxnSp>
+        <p:nvCxnSpPr>
+          <p:cNvPr id="47" name="Gerader Verbinder 46">
+            <a:extLst>
+              <a:ext uri="{FF2B5EF4-FFF2-40B4-BE49-F238E27FC236}">
+                <a16:creationId xmlns:a16="http://schemas.microsoft.com/office/drawing/2014/main" id="{24C8D774-FC67-6ACD-8AEA-8D09E12837F0}"/>
+              </a:ext>
+            </a:extLst>
+          </p:cNvPr>
+          <p:cNvCxnSpPr>
+            <a:cxnSpLocks/>
+          </p:cNvCxnSpPr>
+          <p:nvPr/>
+        </p:nvCxnSpPr>
+        <p:spPr>
+          <a:xfrm>
+            <a:off x="591838" y="1291690"/>
+            <a:ext cx="96632" cy="253670"/>
+          </a:xfrm>
+          <a:prstGeom prst="line">
+            <a:avLst/>
+          </a:prstGeom>
+          <a:ln w="6350">
+            <a:solidFill>
+              <a:schemeClr val="accent2">
+                <a:lumMod val="40000"/>
+                <a:lumOff val="60000"/>
+              </a:schemeClr>
+            </a:solidFill>
+          </a:ln>
+        </p:spPr>
+        <p:style>
+          <a:lnRef idx="2">
+            <a:schemeClr val="accent1"/>
+          </a:lnRef>
+          <a:fillRef idx="0">
+            <a:schemeClr val="accent1"/>
+          </a:fillRef>
+          <a:effectRef idx="1">
+            <a:schemeClr val="accent1"/>
+          </a:effectRef>
+          <a:fontRef idx="minor">
+            <a:schemeClr val="tx1"/>
+          </a:fontRef>
+        </p:style>
+      </p:cxnSp>
+      <p:cxnSp>
+        <p:nvCxnSpPr>
+          <p:cNvPr id="48" name="Gerader Verbinder 47">
+            <a:extLst>
+              <a:ext uri="{FF2B5EF4-FFF2-40B4-BE49-F238E27FC236}">
+                <a16:creationId xmlns:a16="http://schemas.microsoft.com/office/drawing/2014/main" id="{25FC1884-FC96-B663-D701-929691ACCE43}"/>
+              </a:ext>
+            </a:extLst>
+          </p:cNvPr>
+          <p:cNvCxnSpPr/>
+          <p:nvPr/>
+        </p:nvCxnSpPr>
+        <p:spPr>
+          <a:xfrm>
+            <a:off x="2254547" y="2121713"/>
+            <a:ext cx="197962" cy="183794"/>
+          </a:xfrm>
+          <a:prstGeom prst="line">
+            <a:avLst/>
+          </a:prstGeom>
+          <a:ln w="6350">
+            <a:solidFill>
+              <a:schemeClr val="accent2">
+                <a:lumMod val="40000"/>
+                <a:lumOff val="60000"/>
+              </a:schemeClr>
+            </a:solidFill>
+          </a:ln>
+        </p:spPr>
+        <p:style>
+          <a:lnRef idx="2">
+            <a:schemeClr val="accent1"/>
+          </a:lnRef>
+          <a:fillRef idx="0">
+            <a:schemeClr val="accent1"/>
+          </a:fillRef>
+          <a:effectRef idx="1">
+            <a:schemeClr val="accent1"/>
+          </a:effectRef>
+          <a:fontRef idx="minor">
+            <a:schemeClr val="tx1"/>
+          </a:fontRef>
+        </p:style>
+      </p:cxnSp>
+      <p:cxnSp>
+        <p:nvCxnSpPr>
+          <p:cNvPr id="49" name="Gerader Verbinder 48">
+            <a:extLst>
+              <a:ext uri="{FF2B5EF4-FFF2-40B4-BE49-F238E27FC236}">
+                <a16:creationId xmlns:a16="http://schemas.microsoft.com/office/drawing/2014/main" id="{B46D2CC3-6112-1F63-6E2A-EE499038D6C4}"/>
+              </a:ext>
+            </a:extLst>
+          </p:cNvPr>
+          <p:cNvCxnSpPr>
+            <a:cxnSpLocks/>
+          </p:cNvCxnSpPr>
+          <p:nvPr/>
+        </p:nvCxnSpPr>
+        <p:spPr>
+          <a:xfrm flipV="1">
+            <a:off x="5235130" y="1032362"/>
+            <a:ext cx="88159" cy="79339"/>
+          </a:xfrm>
+          <a:prstGeom prst="line">
+            <a:avLst/>
+          </a:prstGeom>
+          <a:ln w="6350">
+            <a:solidFill>
+              <a:schemeClr val="accent2">
+                <a:lumMod val="40000"/>
+                <a:lumOff val="60000"/>
+              </a:schemeClr>
+            </a:solidFill>
+          </a:ln>
+        </p:spPr>
+        <p:style>
+          <a:lnRef idx="2">
+            <a:schemeClr val="accent1"/>
+          </a:lnRef>
+          <a:fillRef idx="0">
+            <a:schemeClr val="accent1"/>
+          </a:fillRef>
+          <a:effectRef idx="1">
+            <a:schemeClr val="accent1"/>
+          </a:effectRef>
+          <a:fontRef idx="minor">
+            <a:schemeClr val="tx1"/>
+          </a:fontRef>
+        </p:style>
+      </p:cxnSp>
+      <p:cxnSp>
+        <p:nvCxnSpPr>
+          <p:cNvPr id="50" name="Gerader Verbinder 49">
+            <a:extLst>
+              <a:ext uri="{FF2B5EF4-FFF2-40B4-BE49-F238E27FC236}">
+                <a16:creationId xmlns:a16="http://schemas.microsoft.com/office/drawing/2014/main" id="{567C740C-4C1F-37F9-532C-1D529D7943F7}"/>
+              </a:ext>
+            </a:extLst>
+          </p:cNvPr>
+          <p:cNvCxnSpPr>
+            <a:cxnSpLocks/>
+          </p:cNvCxnSpPr>
+          <p:nvPr/>
+        </p:nvCxnSpPr>
+        <p:spPr>
+          <a:xfrm flipH="1">
+            <a:off x="2219918" y="779899"/>
+            <a:ext cx="31868" cy="187559"/>
+          </a:xfrm>
+          <a:prstGeom prst="line">
+            <a:avLst/>
+          </a:prstGeom>
+          <a:ln w="6350">
+            <a:solidFill>
+              <a:schemeClr val="accent2">
+                <a:lumMod val="40000"/>
+                <a:lumOff val="60000"/>
+              </a:schemeClr>
+            </a:solidFill>
+          </a:ln>
+        </p:spPr>
+        <p:style>
+          <a:lnRef idx="2">
+            <a:schemeClr val="accent1"/>
+          </a:lnRef>
+          <a:fillRef idx="0">
+            <a:schemeClr val="accent1"/>
+          </a:fillRef>
+          <a:effectRef idx="1">
+            <a:schemeClr val="accent1"/>
+          </a:effectRef>
+          <a:fontRef idx="minor">
+            <a:schemeClr val="tx1"/>
+          </a:fontRef>
+        </p:style>
+      </p:cxnSp>
+      <p:cxnSp>
+        <p:nvCxnSpPr>
+          <p:cNvPr id="51" name="Gerader Verbinder 50">
+            <a:extLst>
+              <a:ext uri="{FF2B5EF4-FFF2-40B4-BE49-F238E27FC236}">
+                <a16:creationId xmlns:a16="http://schemas.microsoft.com/office/drawing/2014/main" id="{F5171D15-E789-775B-F9DB-1C06D638D839}"/>
+              </a:ext>
+            </a:extLst>
+          </p:cNvPr>
+          <p:cNvCxnSpPr>
+            <a:cxnSpLocks/>
+          </p:cNvCxnSpPr>
+          <p:nvPr/>
+        </p:nvCxnSpPr>
+        <p:spPr>
+          <a:xfrm>
+            <a:off x="4924611" y="2067080"/>
+            <a:ext cx="96632" cy="253670"/>
+          </a:xfrm>
+          <a:prstGeom prst="line">
+            <a:avLst/>
+          </a:prstGeom>
+          <a:ln w="6350">
+            <a:solidFill>
+              <a:schemeClr val="accent2">
+                <a:lumMod val="40000"/>
+                <a:lumOff val="60000"/>
+              </a:schemeClr>
+            </a:solidFill>
+          </a:ln>
+        </p:spPr>
+        <p:style>
+          <a:lnRef idx="2">
+            <a:schemeClr val="accent1"/>
+          </a:lnRef>
+          <a:fillRef idx="0">
+            <a:schemeClr val="accent1"/>
+          </a:fillRef>
+          <a:effectRef idx="1">
+            <a:schemeClr val="accent1"/>
+          </a:effectRef>
+          <a:fontRef idx="minor">
+            <a:schemeClr val="tx1"/>
+          </a:fontRef>
+        </p:style>
+      </p:cxnSp>
+      <p:cxnSp>
+        <p:nvCxnSpPr>
+          <p:cNvPr id="52" name="Gerader Verbinder 51">
+            <a:extLst>
+              <a:ext uri="{FF2B5EF4-FFF2-40B4-BE49-F238E27FC236}">
+                <a16:creationId xmlns:a16="http://schemas.microsoft.com/office/drawing/2014/main" id="{4515C5E7-AEAF-1DD5-6440-B36854391429}"/>
+              </a:ext>
+            </a:extLst>
+          </p:cNvPr>
+          <p:cNvCxnSpPr/>
+          <p:nvPr/>
+        </p:nvCxnSpPr>
+        <p:spPr>
+          <a:xfrm>
+            <a:off x="2716989" y="1386062"/>
+            <a:ext cx="197962" cy="183794"/>
+          </a:xfrm>
+          <a:prstGeom prst="line">
+            <a:avLst/>
+          </a:prstGeom>
+          <a:ln w="6350">
+            <a:solidFill>
+              <a:schemeClr val="accent2">
+                <a:lumMod val="40000"/>
+                <a:lumOff val="60000"/>
+              </a:schemeClr>
+            </a:solidFill>
+          </a:ln>
+        </p:spPr>
+        <p:style>
+          <a:lnRef idx="2">
+            <a:schemeClr val="accent1"/>
+          </a:lnRef>
+          <a:fillRef idx="0">
+            <a:schemeClr val="accent1"/>
+          </a:fillRef>
+          <a:effectRef idx="1">
+            <a:schemeClr val="accent1"/>
+          </a:effectRef>
+          <a:fontRef idx="minor">
+            <a:schemeClr val="tx1"/>
+          </a:fontRef>
+        </p:style>
+      </p:cxnSp>
+      <p:cxnSp>
+        <p:nvCxnSpPr>
+          <p:cNvPr id="53" name="Gerader Verbinder 52">
+            <a:extLst>
+              <a:ext uri="{FF2B5EF4-FFF2-40B4-BE49-F238E27FC236}">
+                <a16:creationId xmlns:a16="http://schemas.microsoft.com/office/drawing/2014/main" id="{31EDDA7F-AA53-C998-2814-0C85D78EEFF5}"/>
+              </a:ext>
+            </a:extLst>
+          </p:cNvPr>
+          <p:cNvCxnSpPr>
+            <a:cxnSpLocks/>
+          </p:cNvCxnSpPr>
+          <p:nvPr/>
+        </p:nvCxnSpPr>
+        <p:spPr>
+          <a:xfrm flipV="1">
+            <a:off x="994641" y="223227"/>
+            <a:ext cx="88159" cy="79339"/>
+          </a:xfrm>
+          <a:prstGeom prst="line">
+            <a:avLst/>
+          </a:prstGeom>
+          <a:ln w="6350">
+            <a:solidFill>
+              <a:schemeClr val="accent2">
+                <a:lumMod val="40000"/>
+                <a:lumOff val="60000"/>
+              </a:schemeClr>
+            </a:solidFill>
+          </a:ln>
+        </p:spPr>
+        <p:style>
+          <a:lnRef idx="2">
+            <a:schemeClr val="accent1"/>
+          </a:lnRef>
+          <a:fillRef idx="0">
+            <a:schemeClr val="accent1"/>
+          </a:fillRef>
+          <a:effectRef idx="1">
+            <a:schemeClr val="accent1"/>
+          </a:effectRef>
+          <a:fontRef idx="minor">
+            <a:schemeClr val="tx1"/>
+          </a:fontRef>
+        </p:style>
+      </p:cxnSp>
+    </p:spTree>
+    <p:extLst>
+      <p:ext uri="{BB962C8B-B14F-4D97-AF65-F5344CB8AC3E}">
+        <p14:creationId xmlns:p14="http://schemas.microsoft.com/office/powerpoint/2010/main" val="500933360"/>
+      </p:ext>
+    </p:extLst>
+  </p:cSld>
+  <p:clrMapOvr>
+    <a:masterClrMapping/>
+  </p:clrMapOvr>
+</p:sld>
+</file>
+
+<file path=ppt/slides/slide3.xml><?xml version="1.0" encoding="utf-8"?>
+<p:sld xmlns:a="http://schemas.openxmlformats.org/drawingml/2006/main" xmlns:r="http://schemas.openxmlformats.org/officeDocument/2006/relationships" xmlns:p="http://schemas.openxmlformats.org/presentationml/2006/main">
+  <p:cSld>
+    <p:spTree>
+      <p:nvGrpSpPr>
+        <p:cNvPr id="1" name=""/>
+        <p:cNvGrpSpPr/>
+        <p:nvPr/>
+      </p:nvGrpSpPr>
+      <p:grpSpPr>
+        <a:xfrm>
+          <a:off x="0" y="0"/>
+          <a:ext cx="0" cy="0"/>
+          <a:chOff x="0" y="0"/>
+          <a:chExt cx="0" cy="0"/>
+        </a:xfrm>
+      </p:grpSpPr>
+      <p:cxnSp>
+        <p:nvCxnSpPr>
+          <p:cNvPr id="11" name="Gerader Verbinder 10">
+            <a:extLst>
+              <a:ext uri="{FF2B5EF4-FFF2-40B4-BE49-F238E27FC236}">
+                <a16:creationId xmlns:a16="http://schemas.microsoft.com/office/drawing/2014/main" id="{42733B49-5D3A-E790-9787-F7679098F6D5}"/>
+              </a:ext>
+            </a:extLst>
+          </p:cNvPr>
+          <p:cNvCxnSpPr/>
+          <p:nvPr/>
+        </p:nvCxnSpPr>
+        <p:spPr>
+          <a:xfrm>
+            <a:off x="6006446" y="377072"/>
+            <a:ext cx="0" cy="6480928"/>
+          </a:xfrm>
+          <a:prstGeom prst="line">
+            <a:avLst/>
+          </a:prstGeom>
+        </p:spPr>
+        <p:style>
+          <a:lnRef idx="2">
+            <a:schemeClr val="accent1"/>
+          </a:lnRef>
+          <a:fillRef idx="0">
+            <a:schemeClr val="accent1"/>
+          </a:fillRef>
+          <a:effectRef idx="1">
+            <a:schemeClr val="accent1"/>
+          </a:effectRef>
+          <a:fontRef idx="minor">
+            <a:schemeClr val="tx1"/>
+          </a:fontRef>
+        </p:style>
+      </p:cxnSp>
+      <p:cxnSp>
+        <p:nvCxnSpPr>
+          <p:cNvPr id="10" name="Gerader Verbinder 9">
+            <a:extLst>
+              <a:ext uri="{FF2B5EF4-FFF2-40B4-BE49-F238E27FC236}">
+                <a16:creationId xmlns:a16="http://schemas.microsoft.com/office/drawing/2014/main" id="{64682475-4844-99F3-D395-EAFBB880B4AF}"/>
+              </a:ext>
+            </a:extLst>
+          </p:cNvPr>
+          <p:cNvCxnSpPr/>
+          <p:nvPr/>
+        </p:nvCxnSpPr>
+        <p:spPr>
+          <a:xfrm>
+            <a:off x="3893270" y="377072"/>
+            <a:ext cx="0" cy="6480928"/>
+          </a:xfrm>
+          <a:prstGeom prst="line">
+            <a:avLst/>
+          </a:prstGeom>
+        </p:spPr>
+        <p:style>
+          <a:lnRef idx="2">
+            <a:schemeClr val="accent1"/>
+          </a:lnRef>
+          <a:fillRef idx="0">
+            <a:schemeClr val="accent1"/>
+          </a:fillRef>
+          <a:effectRef idx="1">
+            <a:schemeClr val="accent1"/>
+          </a:effectRef>
+          <a:fontRef idx="minor">
+            <a:schemeClr val="tx1"/>
+          </a:fontRef>
+        </p:style>
+      </p:cxnSp>
+      <p:sp>
+        <p:nvSpPr>
+          <p:cNvPr id="8" name="Rechteck 7">
+            <a:extLst>
+              <a:ext uri="{FF2B5EF4-FFF2-40B4-BE49-F238E27FC236}">
+                <a16:creationId xmlns:a16="http://schemas.microsoft.com/office/drawing/2014/main" id="{6924865C-3B84-5931-3B04-7FCA21DBD4B9}"/>
+              </a:ext>
+            </a:extLst>
+          </p:cNvPr>
+          <p:cNvSpPr/>
+          <p:nvPr/>
+        </p:nvSpPr>
+        <p:spPr>
+          <a:xfrm>
+            <a:off x="87984" y="549463"/>
+            <a:ext cx="4072551" cy="2988297"/>
+          </a:xfrm>
+          <a:prstGeom prst="rect">
+            <a:avLst/>
+          </a:prstGeom>
+          <a:solidFill>
+            <a:schemeClr val="bg2"/>
+          </a:solidFill>
+          <a:ln>
+            <a:noFill/>
+          </a:ln>
+        </p:spPr>
+        <p:style>
+          <a:lnRef idx="2">
+            <a:schemeClr val="accent1">
+              <a:shade val="15000"/>
+            </a:schemeClr>
+          </a:lnRef>
+          <a:fillRef idx="1">
+            <a:schemeClr val="accent1"/>
+          </a:fillRef>
+          <a:effectRef idx="0">
+            <a:schemeClr val="accent1"/>
+          </a:effectRef>
+          <a:fontRef idx="minor">
+            <a:schemeClr val="lt1"/>
+          </a:fontRef>
+        </p:style>
+        <p:txBody>
+          <a:bodyPr rtlCol="0" anchor="ctr"/>
+          <a:lstStyle/>
+          <a:p>
+            <a:pPr algn="ctr"/>
+            <a:endParaRPr lang="de-DE" dirty="0"/>
+          </a:p>
+        </p:txBody>
+      </p:sp>
+      <p:sp>
+        <p:nvSpPr>
+          <p:cNvPr id="7" name="Rechteck 6">
+            <a:extLst>
+              <a:ext uri="{FF2B5EF4-FFF2-40B4-BE49-F238E27FC236}">
+                <a16:creationId xmlns:a16="http://schemas.microsoft.com/office/drawing/2014/main" id="{3335F28C-B6EC-D243-00FF-270408E2C576}"/>
+              </a:ext>
+            </a:extLst>
+          </p:cNvPr>
+          <p:cNvSpPr/>
+          <p:nvPr/>
+        </p:nvSpPr>
+        <p:spPr>
+          <a:xfrm>
+            <a:off x="87984" y="3696021"/>
+            <a:ext cx="3932725" cy="2988297"/>
+          </a:xfrm>
+          <a:prstGeom prst="rect">
+            <a:avLst/>
+          </a:prstGeom>
+          <a:solidFill>
+            <a:schemeClr val="tx1"/>
+          </a:solidFill>
+          <a:ln>
+            <a:noFill/>
+          </a:ln>
+        </p:spPr>
+        <p:style>
+          <a:lnRef idx="2">
+            <a:schemeClr val="accent1">
+              <a:shade val="15000"/>
+            </a:schemeClr>
+          </a:lnRef>
+          <a:fillRef idx="1">
+            <a:schemeClr val="accent1"/>
+          </a:fillRef>
+          <a:effectRef idx="0">
+            <a:schemeClr val="accent1"/>
+          </a:effectRef>
+          <a:fontRef idx="minor">
+            <a:schemeClr val="lt1"/>
+          </a:fontRef>
+        </p:style>
+        <p:txBody>
+          <a:bodyPr rtlCol="0" anchor="ctr"/>
+          <a:lstStyle/>
+          <a:p>
+            <a:pPr algn="ctr"/>
+            <a:endParaRPr lang="de-DE" dirty="0"/>
+          </a:p>
+        </p:txBody>
+      </p:sp>
+      <p:sp>
+        <p:nvSpPr>
+          <p:cNvPr id="5" name="Rechteck 4">
+            <a:extLst>
+              <a:ext uri="{FF2B5EF4-FFF2-40B4-BE49-F238E27FC236}">
+                <a16:creationId xmlns:a16="http://schemas.microsoft.com/office/drawing/2014/main" id="{EA23679C-8FF5-DEA7-72A5-380B2B96444C}"/>
+              </a:ext>
+            </a:extLst>
+          </p:cNvPr>
+          <p:cNvSpPr/>
+          <p:nvPr/>
+        </p:nvSpPr>
+        <p:spPr>
+          <a:xfrm>
+            <a:off x="5858934" y="549465"/>
+            <a:ext cx="6245081" cy="2988297"/>
+          </a:xfrm>
+          <a:prstGeom prst="rect">
+            <a:avLst/>
+          </a:prstGeom>
+          <a:solidFill>
+            <a:schemeClr val="tx1"/>
+          </a:solidFill>
+          <a:ln>
+            <a:noFill/>
+          </a:ln>
+        </p:spPr>
+        <p:style>
+          <a:lnRef idx="2">
+            <a:schemeClr val="accent1">
+              <a:shade val="15000"/>
+            </a:schemeClr>
+          </a:lnRef>
+          <a:fillRef idx="1">
+            <a:schemeClr val="accent1"/>
+          </a:fillRef>
+          <a:effectRef idx="0">
+            <a:schemeClr val="accent1"/>
+          </a:effectRef>
+          <a:fontRef idx="minor">
+            <a:schemeClr val="lt1"/>
+          </a:fontRef>
+        </p:style>
+        <p:txBody>
+          <a:bodyPr rtlCol="0" anchor="ctr"/>
+          <a:lstStyle/>
+          <a:p>
+            <a:pPr algn="ctr"/>
+            <a:endParaRPr lang="de-DE" dirty="0"/>
+          </a:p>
+        </p:txBody>
+      </p:sp>
+      <p:sp>
+        <p:nvSpPr>
+          <p:cNvPr id="3" name="Rechteck 2">
+            <a:extLst>
+              <a:ext uri="{FF2B5EF4-FFF2-40B4-BE49-F238E27FC236}">
+                <a16:creationId xmlns:a16="http://schemas.microsoft.com/office/drawing/2014/main" id="{387B642F-4430-381E-3F1D-676289D4CAC1}"/>
+              </a:ext>
+            </a:extLst>
+          </p:cNvPr>
+          <p:cNvSpPr/>
+          <p:nvPr/>
+        </p:nvSpPr>
+        <p:spPr>
+          <a:xfrm>
+            <a:off x="5527422" y="3696021"/>
+            <a:ext cx="6576594" cy="2988297"/>
+          </a:xfrm>
+          <a:prstGeom prst="rect">
+            <a:avLst/>
+          </a:prstGeom>
+          <a:solidFill>
+            <a:schemeClr val="bg2"/>
+          </a:solidFill>
+          <a:ln>
+            <a:noFill/>
+          </a:ln>
+        </p:spPr>
+        <p:style>
+          <a:lnRef idx="2">
+            <a:schemeClr val="accent1">
+              <a:shade val="15000"/>
+            </a:schemeClr>
+          </a:lnRef>
+          <a:fillRef idx="1">
+            <a:schemeClr val="accent1"/>
+          </a:fillRef>
+          <a:effectRef idx="0">
+            <a:schemeClr val="accent1"/>
+          </a:effectRef>
+          <a:fontRef idx="minor">
+            <a:schemeClr val="lt1"/>
+          </a:fontRef>
+        </p:style>
+        <p:txBody>
+          <a:bodyPr rtlCol="0" anchor="ctr"/>
+          <a:lstStyle/>
+          <a:p>
+            <a:pPr algn="ctr"/>
+            <a:endParaRPr lang="de-DE" dirty="0"/>
+          </a:p>
+        </p:txBody>
+      </p:sp>
+      <p:sp>
+        <p:nvSpPr>
+          <p:cNvPr id="13" name="Rechteck 12">
+            <a:extLst>
+              <a:ext uri="{FF2B5EF4-FFF2-40B4-BE49-F238E27FC236}">
+                <a16:creationId xmlns:a16="http://schemas.microsoft.com/office/drawing/2014/main" id="{FEC7E76B-B3C4-8F9A-70E2-240831EB7A3D}"/>
+              </a:ext>
+            </a:extLst>
+          </p:cNvPr>
+          <p:cNvSpPr/>
+          <p:nvPr/>
+        </p:nvSpPr>
+        <p:spPr>
+          <a:xfrm rot="10800000">
+            <a:off x="4028393" y="3691297"/>
+            <a:ext cx="1838227" cy="2988297"/>
+          </a:xfrm>
+          <a:prstGeom prst="rect">
+            <a:avLst/>
+          </a:prstGeom>
+          <a:gradFill flip="none" rotWithShape="1">
+            <a:gsLst>
+              <a:gs pos="0">
+                <a:srgbClr val="E8E8E8"/>
+              </a:gs>
+              <a:gs pos="100000">
+                <a:schemeClr val="tx1"/>
+              </a:gs>
+            </a:gsLst>
+            <a:lin ang="0" scaled="1"/>
+            <a:tileRect/>
+          </a:gradFill>
+          <a:ln>
+            <a:noFill/>
+          </a:ln>
+        </p:spPr>
+        <p:style>
+          <a:lnRef idx="2">
+            <a:schemeClr val="accent1">
+              <a:shade val="15000"/>
+            </a:schemeClr>
+          </a:lnRef>
+          <a:fillRef idx="1">
+            <a:schemeClr val="accent1"/>
+          </a:fillRef>
+          <a:effectRef idx="0">
+            <a:schemeClr val="accent1"/>
+          </a:effectRef>
+          <a:fontRef idx="minor">
+            <a:schemeClr val="lt1"/>
+          </a:fontRef>
+        </p:style>
+        <p:txBody>
+          <a:bodyPr rtlCol="0" anchor="ctr"/>
+          <a:lstStyle/>
+          <a:p>
+            <a:pPr algn="ctr"/>
+            <a:endParaRPr lang="de-DE" u="sng" dirty="0"/>
+          </a:p>
+        </p:txBody>
+      </p:sp>
+      <p:sp>
+        <p:nvSpPr>
+          <p:cNvPr id="2" name="Rechteck 1">
+            <a:extLst>
+              <a:ext uri="{FF2B5EF4-FFF2-40B4-BE49-F238E27FC236}">
+                <a16:creationId xmlns:a16="http://schemas.microsoft.com/office/drawing/2014/main" id="{70D444C5-626B-40EE-1F7E-D5508ADBD66D}"/>
+              </a:ext>
+            </a:extLst>
+          </p:cNvPr>
+          <p:cNvSpPr/>
+          <p:nvPr/>
+        </p:nvSpPr>
+        <p:spPr>
+          <a:xfrm>
+            <a:off x="4020708" y="549466"/>
+            <a:ext cx="1838227" cy="2988297"/>
+          </a:xfrm>
+          <a:prstGeom prst="rect">
+            <a:avLst/>
+          </a:prstGeom>
+          <a:gradFill flip="none" rotWithShape="1">
+            <a:gsLst>
+              <a:gs pos="0">
+                <a:srgbClr val="E8E8E8"/>
+              </a:gs>
+              <a:gs pos="100000">
+                <a:schemeClr val="tx1"/>
+              </a:gs>
+            </a:gsLst>
+            <a:lin ang="0" scaled="1"/>
+            <a:tileRect/>
+          </a:gradFill>
+          <a:ln>
+            <a:noFill/>
+          </a:ln>
+        </p:spPr>
+        <p:style>
+          <a:lnRef idx="2">
+            <a:schemeClr val="accent1">
+              <a:shade val="15000"/>
+            </a:schemeClr>
+          </a:lnRef>
+          <a:fillRef idx="1">
+            <a:schemeClr val="accent1"/>
+          </a:fillRef>
+          <a:effectRef idx="0">
+            <a:schemeClr val="accent1"/>
+          </a:effectRef>
+          <a:fontRef idx="minor">
+            <a:schemeClr val="lt1"/>
+          </a:fontRef>
+        </p:style>
+        <p:txBody>
+          <a:bodyPr rtlCol="0" anchor="ctr"/>
+          <a:lstStyle/>
+          <a:p>
+            <a:pPr algn="ctr"/>
+            <a:endParaRPr lang="de-DE" u="sng" dirty="0"/>
+          </a:p>
+        </p:txBody>
+      </p:sp>
+    </p:spTree>
+    <p:extLst>
+      <p:ext uri="{BB962C8B-B14F-4D97-AF65-F5344CB8AC3E}">
+        <p14:creationId xmlns:p14="http://schemas.microsoft.com/office/powerpoint/2010/main" val="2324650903"/>
       </p:ext>
     </p:extLst>
   </p:cSld>
@@ -3724,4 +6001,319 @@
     </a:ext>
   </a:extLst>
 </a:theme>
+</file>
+
+<file path=ppt/theme/theme2.xml><?xml version="1.0" encoding="utf-8"?>
+<a:theme xmlns:a="http://schemas.openxmlformats.org/drawingml/2006/main" name="Office">
+  <a:themeElements>
+    <a:clrScheme name="Office">
+      <a:dk1>
+        <a:sysClr val="windowText" lastClr="000000"/>
+      </a:dk1>
+      <a:lt1>
+        <a:sysClr val="window" lastClr="FFFFFF"/>
+      </a:lt1>
+      <a:dk2>
+        <a:srgbClr val="0E2841"/>
+      </a:dk2>
+      <a:lt2>
+        <a:srgbClr val="E8E8E8"/>
+      </a:lt2>
+      <a:accent1>
+        <a:srgbClr val="156082"/>
+      </a:accent1>
+      <a:accent2>
+        <a:srgbClr val="E97132"/>
+      </a:accent2>
+      <a:accent3>
+        <a:srgbClr val="196B24"/>
+      </a:accent3>
+      <a:accent4>
+        <a:srgbClr val="0F9ED5"/>
+      </a:accent4>
+      <a:accent5>
+        <a:srgbClr val="A02B93"/>
+      </a:accent5>
+      <a:accent6>
+        <a:srgbClr val="4EA72E"/>
+      </a:accent6>
+      <a:hlink>
+        <a:srgbClr val="467886"/>
+      </a:hlink>
+      <a:folHlink>
+        <a:srgbClr val="96607D"/>
+      </a:folHlink>
+    </a:clrScheme>
+    <a:fontScheme name="Office">
+      <a:majorFont>
+        <a:latin typeface="Aptos Display" panose="02110004020202020204"/>
+        <a:ea typeface=""/>
+        <a:cs typeface=""/>
+        <a:font script="Jpan" typeface="游ゴシック Light"/>
+        <a:font script="Hang" typeface="맑은 고딕"/>
+        <a:font script="Hans" typeface="等线 Light"/>
+        <a:font script="Hant" typeface="新細明體"/>
+        <a:font script="Arab" typeface="Times New Roman"/>
+        <a:font script="Hebr" typeface="Times New Roman"/>
+        <a:font script="Thai" typeface="Angsana New"/>
+        <a:font script="Ethi" typeface="Nyala"/>
+        <a:font script="Beng" typeface="Vrinda"/>
+        <a:font script="Gujr" typeface="Shruti"/>
+        <a:font script="Khmr" typeface="MoolBoran"/>
+        <a:font script="Knda" typeface="Tunga"/>
+        <a:font script="Guru" typeface="Raavi"/>
+        <a:font script="Cans" typeface="Euphemia"/>
+        <a:font script="Cher" typeface="Plantagenet Cherokee"/>
+        <a:font script="Yiii" typeface="Microsoft Yi Baiti"/>
+        <a:font script="Tibt" typeface="Microsoft Himalaya"/>
+        <a:font script="Thaa" typeface="MV Boli"/>
+        <a:font script="Deva" typeface="Mangal"/>
+        <a:font script="Telu" typeface="Gautami"/>
+        <a:font script="Taml" typeface="Latha"/>
+        <a:font script="Syrc" typeface="Estrangelo Edessa"/>
+        <a:font script="Orya" typeface="Kalinga"/>
+        <a:font script="Mlym" typeface="Kartika"/>
+        <a:font script="Laoo" typeface="DokChampa"/>
+        <a:font script="Sinh" typeface="Iskoola Pota"/>
+        <a:font script="Mong" typeface="Mongolian Baiti"/>
+        <a:font script="Viet" typeface="Times New Roman"/>
+        <a:font script="Uigh" typeface="Microsoft Uighur"/>
+        <a:font script="Geor" typeface="Sylfaen"/>
+        <a:font script="Armn" typeface="Arial"/>
+        <a:font script="Bugi" typeface="Leelawadee UI"/>
+        <a:font script="Bopo" typeface="Microsoft JhengHei"/>
+        <a:font script="Java" typeface="Javanese Text"/>
+        <a:font script="Lisu" typeface="Segoe UI"/>
+        <a:font script="Mymr" typeface="Myanmar Text"/>
+        <a:font script="Nkoo" typeface="Ebrima"/>
+        <a:font script="Olck" typeface="Nirmala UI"/>
+        <a:font script="Osma" typeface="Ebrima"/>
+        <a:font script="Phag" typeface="Phagspa"/>
+        <a:font script="Syrn" typeface="Estrangelo Edessa"/>
+        <a:font script="Syrj" typeface="Estrangelo Edessa"/>
+        <a:font script="Syre" typeface="Estrangelo Edessa"/>
+        <a:font script="Sora" typeface="Nirmala UI"/>
+        <a:font script="Tale" typeface="Microsoft Tai Le"/>
+        <a:font script="Talu" typeface="Microsoft New Tai Lue"/>
+        <a:font script="Tfng" typeface="Ebrima"/>
+      </a:majorFont>
+      <a:minorFont>
+        <a:latin typeface="Aptos" panose="02110004020202020204"/>
+        <a:ea typeface=""/>
+        <a:cs typeface=""/>
+        <a:font script="Jpan" typeface="游ゴシック"/>
+        <a:font script="Hang" typeface="맑은 고딕"/>
+        <a:font script="Hans" typeface="等线"/>
+        <a:font script="Hant" typeface="新細明體"/>
+        <a:font script="Arab" typeface="Arial"/>
+        <a:font script="Hebr" typeface="Arial"/>
+        <a:font script="Thai" typeface="Cordia New"/>
+        <a:font script="Ethi" typeface="Nyala"/>
+        <a:font script="Beng" typeface="Vrinda"/>
+        <a:font script="Gujr" typeface="Shruti"/>
+        <a:font script="Khmr" typeface="DaunPenh"/>
+        <a:font script="Knda" typeface="Tunga"/>
+        <a:font script="Guru" typeface="Raavi"/>
+        <a:font script="Cans" typeface="Euphemia"/>
+        <a:font script="Cher" typeface="Plantagenet Cherokee"/>
+        <a:font script="Yiii" typeface="Microsoft Yi Baiti"/>
+        <a:font script="Tibt" typeface="Microsoft Himalaya"/>
+        <a:font script="Thaa" typeface="MV Boli"/>
+        <a:font script="Deva" typeface="Mangal"/>
+        <a:font script="Telu" typeface="Gautami"/>
+        <a:font script="Taml" typeface="Latha"/>
+        <a:font script="Syrc" typeface="Estrangelo Edessa"/>
+        <a:font script="Orya" typeface="Kalinga"/>
+        <a:font script="Mlym" typeface="Kartika"/>
+        <a:font script="Laoo" typeface="DokChampa"/>
+        <a:font script="Sinh" typeface="Iskoola Pota"/>
+        <a:font script="Mong" typeface="Mongolian Baiti"/>
+        <a:font script="Viet" typeface="Arial"/>
+        <a:font script="Uigh" typeface="Microsoft Uighur"/>
+        <a:font script="Geor" typeface="Sylfaen"/>
+        <a:font script="Armn" typeface="Arial"/>
+        <a:font script="Bugi" typeface="Leelawadee UI"/>
+        <a:font script="Bopo" typeface="Microsoft JhengHei"/>
+        <a:font script="Java" typeface="Javanese Text"/>
+        <a:font script="Lisu" typeface="Segoe UI"/>
+        <a:font script="Mymr" typeface="Myanmar Text"/>
+        <a:font script="Nkoo" typeface="Ebrima"/>
+        <a:font script="Olck" typeface="Nirmala UI"/>
+        <a:font script="Osma" typeface="Ebrima"/>
+        <a:font script="Phag" typeface="Phagspa"/>
+        <a:font script="Syrn" typeface="Estrangelo Edessa"/>
+        <a:font script="Syrj" typeface="Estrangelo Edessa"/>
+        <a:font script="Syre" typeface="Estrangelo Edessa"/>
+        <a:font script="Sora" typeface="Nirmala UI"/>
+        <a:font script="Tale" typeface="Microsoft Tai Le"/>
+        <a:font script="Talu" typeface="Microsoft New Tai Lue"/>
+        <a:font script="Tfng" typeface="Ebrima"/>
+      </a:minorFont>
+    </a:fontScheme>
+    <a:fmtScheme name="Office">
+      <a:fillStyleLst>
+        <a:solidFill>
+          <a:schemeClr val="phClr"/>
+        </a:solidFill>
+        <a:gradFill rotWithShape="1">
+          <a:gsLst>
+            <a:gs pos="0">
+              <a:schemeClr val="phClr">
+                <a:lumMod val="110000"/>
+                <a:satMod val="105000"/>
+                <a:tint val="67000"/>
+              </a:schemeClr>
+            </a:gs>
+            <a:gs pos="50000">
+              <a:schemeClr val="phClr">
+                <a:lumMod val="105000"/>
+                <a:satMod val="103000"/>
+                <a:tint val="73000"/>
+              </a:schemeClr>
+            </a:gs>
+            <a:gs pos="100000">
+              <a:schemeClr val="phClr">
+                <a:lumMod val="105000"/>
+                <a:satMod val="109000"/>
+                <a:tint val="81000"/>
+              </a:schemeClr>
+            </a:gs>
+          </a:gsLst>
+          <a:lin ang="5400000" scaled="0"/>
+        </a:gradFill>
+        <a:gradFill rotWithShape="1">
+          <a:gsLst>
+            <a:gs pos="0">
+              <a:schemeClr val="phClr">
+                <a:satMod val="103000"/>
+                <a:lumMod val="102000"/>
+                <a:tint val="94000"/>
+              </a:schemeClr>
+            </a:gs>
+            <a:gs pos="50000">
+              <a:schemeClr val="phClr">
+                <a:satMod val="110000"/>
+                <a:lumMod val="100000"/>
+                <a:shade val="100000"/>
+              </a:schemeClr>
+            </a:gs>
+            <a:gs pos="100000">
+              <a:schemeClr val="phClr">
+                <a:lumMod val="99000"/>
+                <a:satMod val="120000"/>
+                <a:shade val="78000"/>
+              </a:schemeClr>
+            </a:gs>
+          </a:gsLst>
+          <a:lin ang="5400000" scaled="0"/>
+        </a:gradFill>
+      </a:fillStyleLst>
+      <a:lnStyleLst>
+        <a:ln w="12700" cap="flat" cmpd="sng" algn="ctr">
+          <a:solidFill>
+            <a:schemeClr val="phClr"/>
+          </a:solidFill>
+          <a:prstDash val="solid"/>
+          <a:miter lim="800000"/>
+        </a:ln>
+        <a:ln w="19050" cap="flat" cmpd="sng" algn="ctr">
+          <a:solidFill>
+            <a:schemeClr val="phClr"/>
+          </a:solidFill>
+          <a:prstDash val="solid"/>
+          <a:miter lim="800000"/>
+        </a:ln>
+        <a:ln w="25400" cap="flat" cmpd="sng" algn="ctr">
+          <a:solidFill>
+            <a:schemeClr val="phClr"/>
+          </a:solidFill>
+          <a:prstDash val="solid"/>
+          <a:miter lim="800000"/>
+        </a:ln>
+      </a:lnStyleLst>
+      <a:effectStyleLst>
+        <a:effectStyle>
+          <a:effectLst/>
+        </a:effectStyle>
+        <a:effectStyle>
+          <a:effectLst/>
+        </a:effectStyle>
+        <a:effectStyle>
+          <a:effectLst>
+            <a:outerShdw blurRad="57150" dist="19050" dir="5400000" algn="ctr" rotWithShape="0">
+              <a:srgbClr val="000000">
+                <a:alpha val="63000"/>
+              </a:srgbClr>
+            </a:outerShdw>
+          </a:effectLst>
+        </a:effectStyle>
+      </a:effectStyleLst>
+      <a:bgFillStyleLst>
+        <a:solidFill>
+          <a:schemeClr val="phClr"/>
+        </a:solidFill>
+        <a:solidFill>
+          <a:schemeClr val="phClr">
+            <a:tint val="95000"/>
+            <a:satMod val="170000"/>
+          </a:schemeClr>
+        </a:solidFill>
+        <a:gradFill rotWithShape="1">
+          <a:gsLst>
+            <a:gs pos="0">
+              <a:schemeClr val="phClr">
+                <a:tint val="93000"/>
+                <a:satMod val="150000"/>
+                <a:shade val="98000"/>
+                <a:lumMod val="102000"/>
+              </a:schemeClr>
+            </a:gs>
+            <a:gs pos="50000">
+              <a:schemeClr val="phClr">
+                <a:tint val="98000"/>
+                <a:satMod val="130000"/>
+                <a:shade val="90000"/>
+                <a:lumMod val="103000"/>
+              </a:schemeClr>
+            </a:gs>
+            <a:gs pos="100000">
+              <a:schemeClr val="phClr">
+                <a:shade val="63000"/>
+                <a:satMod val="120000"/>
+              </a:schemeClr>
+            </a:gs>
+          </a:gsLst>
+          <a:lin ang="5400000" scaled="0"/>
+        </a:gradFill>
+      </a:bgFillStyleLst>
+    </a:fmtScheme>
+  </a:themeElements>
+  <a:objectDefaults>
+    <a:lnDef>
+      <a:spPr/>
+      <a:bodyPr/>
+      <a:lstStyle/>
+      <a:style>
+        <a:lnRef idx="2">
+          <a:schemeClr val="accent1"/>
+        </a:lnRef>
+        <a:fillRef idx="0">
+          <a:schemeClr val="accent1"/>
+        </a:fillRef>
+        <a:effectRef idx="1">
+          <a:schemeClr val="accent1"/>
+        </a:effectRef>
+        <a:fontRef idx="minor">
+          <a:schemeClr val="tx1"/>
+        </a:fontRef>
+      </a:style>
+    </a:lnDef>
+  </a:objectDefaults>
+  <a:extraClrSchemeLst/>
+  <a:extLst>
+    <a:ext uri="{05A4C25C-085E-4340-85A3-A5531E510DB2}">
+      <thm15:themeFamily xmlns:thm15="http://schemas.microsoft.com/office/thememl/2012/main" name="Office Theme" id="{2E142A2C-CD16-42D6-873A-C26D2A0506FA}" vid="{1BDDFF52-6CD6-40A5-AB3C-68EB2F1E4D0A}"/>
+    </a:ext>
+  </a:extLst>
+</a:theme>
 </file>
</xml_diff>